<commit_message>
Adding final touches to the demo slides and cleaning up the output folders
</commit_message>
<xml_diff>
--- a/Demo Slides.pptx
+++ b/Demo Slides.pptx
@@ -20,6 +20,7 @@
     <p:sldId id="272" r:id="rId17"/>
     <p:sldId id="273" r:id="rId18"/>
     <p:sldId id="274" r:id="rId19"/>
+    <p:sldId id="275" r:id="rId20"/>
   </p:sldIdLst>
   <p:sldSz cx="12192000" cy="6858000"/>
   <p:notesSz cx="6858000" cy="9144000"/>
@@ -355,7 +356,7 @@
                 <c:formatCode>General</c:formatCode>
                 <c:ptCount val="5"/>
                 <c:pt idx="0">
-                  <c:v>0.3</c:v>
+                  <c:v>7.5</c:v>
                 </c:pt>
                 <c:pt idx="1">
                   <c:v>18.260000000000002</c:v>
@@ -364,7 +365,7 @@
                   <c:v>20.14</c:v>
                 </c:pt>
                 <c:pt idx="3">
-                  <c:v>4.72</c:v>
+                  <c:v>12.08</c:v>
                 </c:pt>
                 <c:pt idx="4">
                   <c:v>11.82</c:v>
@@ -808,7 +809,7 @@
                 <c:formatCode>General</c:formatCode>
                 <c:ptCount val="5"/>
                 <c:pt idx="0">
-                  <c:v>1193.04</c:v>
+                  <c:v>34580</c:v>
                 </c:pt>
                 <c:pt idx="1">
                   <c:v>81.3</c:v>
@@ -817,7 +818,7 @@
                   <c:v>102.18</c:v>
                 </c:pt>
                 <c:pt idx="3">
-                  <c:v>891.58</c:v>
+                  <c:v>386.62</c:v>
                 </c:pt>
                 <c:pt idx="4">
                   <c:v>193.76</c:v>
@@ -1270,7 +1271,7 @@
                   <c:v>0</c:v>
                 </c:pt>
                 <c:pt idx="3">
-                  <c:v>29</c:v>
+                  <c:v>5</c:v>
                 </c:pt>
                 <c:pt idx="4">
                   <c:v>0</c:v>
@@ -1719,7 +1720,7 @@
                 <c:formatCode>General</c:formatCode>
                 <c:ptCount val="5"/>
                 <c:pt idx="0">
-                  <c:v>0.05</c:v>
+                  <c:v>1.1299999999999999</c:v>
                 </c:pt>
                 <c:pt idx="1">
                   <c:v>1.61</c:v>
@@ -1728,7 +1729,7 @@
                   <c:v>1.31</c:v>
                 </c:pt>
                 <c:pt idx="3">
-                  <c:v>0.49</c:v>
+                  <c:v>1.29</c:v>
                 </c:pt>
                 <c:pt idx="4">
                   <c:v>1.17</c:v>
@@ -2172,19 +2173,19 @@
                 <c:formatCode>General</c:formatCode>
                 <c:ptCount val="5"/>
                 <c:pt idx="0">
-                  <c:v>58.54</c:v>
+                  <c:v>58.18</c:v>
                 </c:pt>
                 <c:pt idx="1">
-                  <c:v>0.96</c:v>
+                  <c:v>0.99</c:v>
                 </c:pt>
                 <c:pt idx="2">
-                  <c:v>1.38</c:v>
+                  <c:v>1.4</c:v>
                 </c:pt>
                 <c:pt idx="3">
-                  <c:v>45.15</c:v>
+                  <c:v>13.26</c:v>
                 </c:pt>
                 <c:pt idx="4">
-                  <c:v>5.91</c:v>
+                  <c:v>5.33</c:v>
                 </c:pt>
               </c:numCache>
             </c:numRef>
@@ -2391,6 +2392,1167 @@
     </a:p>
   </c:txPr>
   <c:externalData r:id="rId3">
+    <c:autoUpdate val="0"/>
+  </c:externalData>
+</c:chartSpace>
+</file>
+
+<file path=ppt/charts/chart6.xml><?xml version="1.0" encoding="utf-8"?>
+<c:chartSpace xmlns:c="http://schemas.openxmlformats.org/drawingml/2006/chart" xmlns:a="http://schemas.openxmlformats.org/drawingml/2006/main" xmlns:r="http://schemas.openxmlformats.org/officeDocument/2006/relationships" xmlns:c16r2="http://schemas.microsoft.com/office/drawing/2015/06/chart">
+  <c:date1904 val="0"/>
+  <c:lang val="en-US"/>
+  <c:roundedCorners val="0"/>
+  <mc:AlternateContent xmlns:mc="http://schemas.openxmlformats.org/markup-compatibility/2006">
+    <mc:Choice xmlns:c14="http://schemas.microsoft.com/office/drawing/2007/8/2/chart" Requires="c14">
+      <c14:style val="102"/>
+    </mc:Choice>
+    <mc:Fallback>
+      <c:style val="2"/>
+    </mc:Fallback>
+  </mc:AlternateContent>
+  <c:chart>
+    <c:title>
+      <c:tx>
+        <c:rich>
+          <a:bodyPr rot="0" spcFirstLastPara="1" vertOverflow="ellipsis" vert="horz" wrap="square" anchor="ctr" anchorCtr="1"/>
+          <a:lstStyle/>
+          <a:p>
+            <a:pPr>
+              <a:defRPr sz="1862" b="0" i="0" u="none" strike="noStrike" kern="1200" spc="0" baseline="0">
+                <a:solidFill>
+                  <a:schemeClr val="tx1">
+                    <a:lumMod val="65000"/>
+                    <a:lumOff val="35000"/>
+                  </a:schemeClr>
+                </a:solidFill>
+                <a:latin typeface="+mn-lt"/>
+                <a:ea typeface="+mn-ea"/>
+                <a:cs typeface="+mn-cs"/>
+              </a:defRPr>
+            </a:pPr>
+            <a:r>
+              <a:rPr lang="en-US" dirty="0"/>
+              <a:t>Execution Time (in seconds)</a:t>
+            </a:r>
+            <a:endParaRPr lang="en-US" baseline="-25000" dirty="0"/>
+          </a:p>
+        </c:rich>
+      </c:tx>
+      <c:overlay val="0"/>
+      <c:spPr>
+        <a:noFill/>
+        <a:ln>
+          <a:noFill/>
+        </a:ln>
+        <a:effectLst/>
+      </c:spPr>
+    </c:title>
+    <c:autoTitleDeleted val="0"/>
+    <c:plotArea>
+      <c:layout/>
+      <c:lineChart>
+        <c:grouping val="standard"/>
+        <c:varyColors val="1"/>
+        <c:ser>
+          <c:idx val="0"/>
+          <c:order val="0"/>
+          <c:tx>
+            <c:strRef>
+              <c:f>Sheet1!$B$1</c:f>
+              <c:strCache>
+                <c:ptCount val="1"/>
+                <c:pt idx="0">
+                  <c:v>Execution Time</c:v>
+                </c:pt>
+              </c:strCache>
+            </c:strRef>
+          </c:tx>
+          <c:spPr>
+            <a:ln w="28575" cap="rnd">
+              <a:solidFill>
+                <a:schemeClr val="accent3">
+                  <a:lumMod val="60000"/>
+                  <a:lumOff val="40000"/>
+                </a:schemeClr>
+              </a:solidFill>
+              <a:round/>
+            </a:ln>
+            <a:effectLst/>
+          </c:spPr>
+          <c:marker>
+            <c:symbol val="circle"/>
+            <c:size val="5"/>
+            <c:spPr>
+              <a:solidFill>
+                <a:schemeClr val="accent3">
+                  <a:lumMod val="75000"/>
+                </a:schemeClr>
+              </a:solidFill>
+              <a:ln w="9525">
+                <a:solidFill>
+                  <a:schemeClr val="accent3">
+                    <a:lumMod val="75000"/>
+                  </a:schemeClr>
+                </a:solidFill>
+              </a:ln>
+              <a:effectLst/>
+            </c:spPr>
+          </c:marker>
+          <c:dPt>
+            <c:idx val="0"/>
+            <c:bubble3D val="0"/>
+            <c:extLst>
+              <c:ext xmlns:c16="http://schemas.microsoft.com/office/drawing/2014/chart" uri="{C3380CC4-5D6E-409C-BE32-E72D297353CC}">
+                <c16:uniqueId val="{00000000-C276-4D81-9958-4B96745C24F7}"/>
+              </c:ext>
+            </c:extLst>
+          </c:dPt>
+          <c:dPt>
+            <c:idx val="1"/>
+            <c:bubble3D val="0"/>
+            <c:extLst>
+              <c:ext xmlns:c16="http://schemas.microsoft.com/office/drawing/2014/chart" uri="{C3380CC4-5D6E-409C-BE32-E72D297353CC}">
+                <c16:uniqueId val="{00000001-C276-4D81-9958-4B96745C24F7}"/>
+              </c:ext>
+            </c:extLst>
+          </c:dPt>
+          <c:dPt>
+            <c:idx val="2"/>
+            <c:bubble3D val="0"/>
+            <c:extLst>
+              <c:ext xmlns:c16="http://schemas.microsoft.com/office/drawing/2014/chart" uri="{C3380CC4-5D6E-409C-BE32-E72D297353CC}">
+                <c16:uniqueId val="{00000002-C276-4D81-9958-4B96745C24F7}"/>
+              </c:ext>
+            </c:extLst>
+          </c:dPt>
+          <c:dPt>
+            <c:idx val="3"/>
+            <c:bubble3D val="0"/>
+            <c:extLst>
+              <c:ext xmlns:c16="http://schemas.microsoft.com/office/drawing/2014/chart" uri="{C3380CC4-5D6E-409C-BE32-E72D297353CC}">
+                <c16:uniqueId val="{00000003-C276-4D81-9958-4B96745C24F7}"/>
+              </c:ext>
+            </c:extLst>
+          </c:dPt>
+          <c:dPt>
+            <c:idx val="4"/>
+            <c:bubble3D val="0"/>
+            <c:extLst>
+              <c:ext xmlns:c16="http://schemas.microsoft.com/office/drawing/2014/chart" uri="{C3380CC4-5D6E-409C-BE32-E72D297353CC}">
+                <c16:uniqueId val="{00000004-C276-4D81-9958-4B96745C24F7}"/>
+              </c:ext>
+            </c:extLst>
+          </c:dPt>
+          <c:dPt>
+            <c:idx val="5"/>
+            <c:bubble3D val="0"/>
+            <c:extLst>
+              <c:ext xmlns:c16="http://schemas.microsoft.com/office/drawing/2014/chart" uri="{C3380CC4-5D6E-409C-BE32-E72D297353CC}">
+                <c16:uniqueId val="{00000005-C276-4D81-9958-4B96745C24F7}"/>
+              </c:ext>
+            </c:extLst>
+          </c:dPt>
+          <c:dPt>
+            <c:idx val="6"/>
+            <c:bubble3D val="0"/>
+            <c:extLst>
+              <c:ext xmlns:c16="http://schemas.microsoft.com/office/drawing/2014/chart" uri="{C3380CC4-5D6E-409C-BE32-E72D297353CC}">
+                <c16:uniqueId val="{00000006-C276-4D81-9958-4B96745C24F7}"/>
+              </c:ext>
+            </c:extLst>
+          </c:dPt>
+          <c:dPt>
+            <c:idx val="7"/>
+            <c:bubble3D val="0"/>
+            <c:extLst>
+              <c:ext xmlns:c16="http://schemas.microsoft.com/office/drawing/2014/chart" uri="{C3380CC4-5D6E-409C-BE32-E72D297353CC}">
+                <c16:uniqueId val="{00000007-C276-4D81-9958-4B96745C24F7}"/>
+              </c:ext>
+            </c:extLst>
+          </c:dPt>
+          <c:dPt>
+            <c:idx val="8"/>
+            <c:bubble3D val="0"/>
+            <c:extLst>
+              <c:ext xmlns:c16="http://schemas.microsoft.com/office/drawing/2014/chart" uri="{C3380CC4-5D6E-409C-BE32-E72D297353CC}">
+                <c16:uniqueId val="{00000008-C276-4D81-9958-4B96745C24F7}"/>
+              </c:ext>
+            </c:extLst>
+          </c:dPt>
+          <c:dLbls>
+            <c:spPr>
+              <a:noFill/>
+              <a:ln>
+                <a:noFill/>
+              </a:ln>
+              <a:effectLst/>
+            </c:spPr>
+            <c:dLblPos val="t"/>
+            <c:showLegendKey val="0"/>
+            <c:showVal val="1"/>
+            <c:showCatName val="0"/>
+            <c:showSerName val="0"/>
+            <c:showPercent val="0"/>
+            <c:showBubbleSize val="0"/>
+            <c:showLeaderLines val="0"/>
+            <c:extLst>
+              <c:ext xmlns:c15="http://schemas.microsoft.com/office/drawing/2012/chart" uri="{CE6537A1-D6FC-4f65-9D91-7224C49458BB}">
+                <c15:showLeaderLines val="1"/>
+              </c:ext>
+            </c:extLst>
+          </c:dLbls>
+          <c:cat>
+            <c:strRef>
+              <c:f>Sheet1!$A$2:$A$11</c:f>
+              <c:strCache>
+                <c:ptCount val="10"/>
+                <c:pt idx="0">
+                  <c:v>2x2</c:v>
+                </c:pt>
+                <c:pt idx="1">
+                  <c:v>3x2</c:v>
+                </c:pt>
+                <c:pt idx="2">
+                  <c:v>3x3</c:v>
+                </c:pt>
+                <c:pt idx="3">
+                  <c:v>4x3</c:v>
+                </c:pt>
+                <c:pt idx="4">
+                  <c:v>4x4</c:v>
+                </c:pt>
+                <c:pt idx="5">
+                  <c:v>5x4</c:v>
+                </c:pt>
+                <c:pt idx="6">
+                  <c:v>5x5</c:v>
+                </c:pt>
+                <c:pt idx="7">
+                  <c:v>6x5</c:v>
+                </c:pt>
+                <c:pt idx="8">
+                  <c:v>6x6</c:v>
+                </c:pt>
+                <c:pt idx="9">
+                  <c:v>7x6</c:v>
+                </c:pt>
+              </c:strCache>
+            </c:strRef>
+          </c:cat>
+          <c:val>
+            <c:numRef>
+              <c:f>Sheet1!$B$2:$B$11</c:f>
+              <c:numCache>
+                <c:formatCode>General</c:formatCode>
+                <c:ptCount val="10"/>
+                <c:pt idx="0">
+                  <c:v>3.5000000000000001E-3</c:v>
+                </c:pt>
+                <c:pt idx="1">
+                  <c:v>1.6400000000000001E-2</c:v>
+                </c:pt>
+                <c:pt idx="2">
+                  <c:v>4.9724000000000004</c:v>
+                </c:pt>
+                <c:pt idx="3">
+                  <c:v>485.3732</c:v>
+                </c:pt>
+                <c:pt idx="4">
+                  <c:v>3600</c:v>
+                </c:pt>
+                <c:pt idx="5">
+                  <c:v>3600</c:v>
+                </c:pt>
+                <c:pt idx="6">
+                  <c:v>3600</c:v>
+                </c:pt>
+                <c:pt idx="7">
+                  <c:v>3600</c:v>
+                </c:pt>
+                <c:pt idx="8">
+                  <c:v>3600</c:v>
+                </c:pt>
+                <c:pt idx="9">
+                  <c:v>3600</c:v>
+                </c:pt>
+              </c:numCache>
+            </c:numRef>
+          </c:val>
+          <c:smooth val="0"/>
+          <c:extLst>
+            <c:ext xmlns:c16="http://schemas.microsoft.com/office/drawing/2014/chart" uri="{C3380CC4-5D6E-409C-BE32-E72D297353CC}">
+              <c16:uniqueId val="{00000009-C276-4D81-9958-4B96745C24F7}"/>
+            </c:ext>
+          </c:extLst>
+        </c:ser>
+        <c:dLbls>
+          <c:dLblPos val="t"/>
+          <c:showLegendKey val="0"/>
+          <c:showVal val="1"/>
+          <c:showCatName val="0"/>
+          <c:showSerName val="0"/>
+          <c:showPercent val="0"/>
+          <c:showBubbleSize val="0"/>
+        </c:dLbls>
+        <c:marker val="1"/>
+        <c:smooth val="0"/>
+        <c:axId val="487448632"/>
+        <c:axId val="487450272"/>
+      </c:lineChart>
+      <c:catAx>
+        <c:axId val="487448632"/>
+        <c:scaling>
+          <c:orientation val="minMax"/>
+        </c:scaling>
+        <c:delete val="0"/>
+        <c:axPos val="b"/>
+        <c:numFmt formatCode="General" sourceLinked="1"/>
+        <c:majorTickMark val="none"/>
+        <c:minorTickMark val="none"/>
+        <c:tickLblPos val="nextTo"/>
+        <c:spPr>
+          <a:noFill/>
+          <a:ln w="9525" cap="flat" cmpd="sng" algn="ctr">
+            <a:solidFill>
+              <a:schemeClr val="tx1">
+                <a:lumMod val="15000"/>
+                <a:lumOff val="85000"/>
+              </a:schemeClr>
+            </a:solidFill>
+            <a:round/>
+          </a:ln>
+          <a:effectLst/>
+        </c:spPr>
+        <c:txPr>
+          <a:bodyPr rot="-60000000" spcFirstLastPara="1" vertOverflow="ellipsis" vert="horz" wrap="square" anchor="ctr" anchorCtr="1"/>
+          <a:lstStyle/>
+          <a:p>
+            <a:pPr>
+              <a:defRPr sz="1197" b="0" i="0" u="none" strike="noStrike" kern="1200" baseline="0">
+                <a:solidFill>
+                  <a:schemeClr val="tx1">
+                    <a:lumMod val="65000"/>
+                    <a:lumOff val="35000"/>
+                  </a:schemeClr>
+                </a:solidFill>
+                <a:latin typeface="+mn-lt"/>
+                <a:ea typeface="+mn-ea"/>
+                <a:cs typeface="+mn-cs"/>
+              </a:defRPr>
+            </a:pPr>
+            <a:endParaRPr lang="en-US"/>
+          </a:p>
+        </c:txPr>
+        <c:crossAx val="487450272"/>
+        <c:crosses val="autoZero"/>
+        <c:auto val="1"/>
+        <c:lblAlgn val="ctr"/>
+        <c:lblOffset val="100"/>
+        <c:noMultiLvlLbl val="0"/>
+      </c:catAx>
+      <c:valAx>
+        <c:axId val="487450272"/>
+        <c:scaling>
+          <c:orientation val="minMax"/>
+        </c:scaling>
+        <c:delete val="0"/>
+        <c:axPos val="l"/>
+        <c:numFmt formatCode="General" sourceLinked="1"/>
+        <c:majorTickMark val="none"/>
+        <c:minorTickMark val="none"/>
+        <c:tickLblPos val="nextTo"/>
+        <c:spPr>
+          <a:noFill/>
+          <a:ln>
+            <a:noFill/>
+          </a:ln>
+          <a:effectLst/>
+        </c:spPr>
+        <c:txPr>
+          <a:bodyPr rot="-60000000" spcFirstLastPara="1" vertOverflow="ellipsis" vert="horz" wrap="square" anchor="ctr" anchorCtr="1"/>
+          <a:lstStyle/>
+          <a:p>
+            <a:pPr>
+              <a:defRPr sz="1197" b="0" i="0" u="none" strike="noStrike" kern="1200" baseline="0">
+                <a:solidFill>
+                  <a:schemeClr val="tx1">
+                    <a:lumMod val="65000"/>
+                    <a:lumOff val="35000"/>
+                  </a:schemeClr>
+                </a:solidFill>
+                <a:latin typeface="+mn-lt"/>
+                <a:ea typeface="+mn-ea"/>
+                <a:cs typeface="+mn-cs"/>
+              </a:defRPr>
+            </a:pPr>
+            <a:endParaRPr lang="en-US"/>
+          </a:p>
+        </c:txPr>
+        <c:crossAx val="487448632"/>
+        <c:crosses val="autoZero"/>
+        <c:crossBetween val="between"/>
+      </c:valAx>
+      <c:spPr>
+        <a:noFill/>
+        <a:ln>
+          <a:noFill/>
+        </a:ln>
+        <a:effectLst/>
+      </c:spPr>
+    </c:plotArea>
+    <c:plotVisOnly val="1"/>
+    <c:dispBlanksAs val="gap"/>
+    <c:extLst>
+      <c:ext xmlns:c16r3="http://schemas.microsoft.com/office/drawing/2017/03/chart" uri="{56B9EC1D-385E-4148-901F-78D8002777C0}">
+        <c16r3:dataDisplayOptions16>
+          <c16r3:dispNaAsBlank val="1"/>
+        </c16r3:dataDisplayOptions16>
+      </c:ext>
+    </c:extLst>
+    <c:showDLblsOverMax val="0"/>
+  </c:chart>
+  <c:spPr>
+    <a:noFill/>
+    <a:ln>
+      <a:solidFill>
+        <a:schemeClr val="accent3">
+          <a:lumMod val="75000"/>
+        </a:schemeClr>
+      </a:solidFill>
+    </a:ln>
+    <a:effectLst/>
+  </c:spPr>
+  <c:txPr>
+    <a:bodyPr/>
+    <a:lstStyle/>
+    <a:p>
+      <a:pPr>
+        <a:defRPr/>
+      </a:pPr>
+      <a:endParaRPr lang="en-US"/>
+    </a:p>
+  </c:txPr>
+  <c:externalData r:id="rId1">
+    <c:autoUpdate val="0"/>
+  </c:externalData>
+</c:chartSpace>
+</file>
+
+<file path=ppt/charts/chart7.xml><?xml version="1.0" encoding="utf-8"?>
+<c:chartSpace xmlns:c="http://schemas.openxmlformats.org/drawingml/2006/chart" xmlns:a="http://schemas.openxmlformats.org/drawingml/2006/main" xmlns:r="http://schemas.openxmlformats.org/officeDocument/2006/relationships" xmlns:c16r2="http://schemas.microsoft.com/office/drawing/2015/06/chart">
+  <c:date1904 val="0"/>
+  <c:lang val="en-US"/>
+  <c:roundedCorners val="0"/>
+  <mc:AlternateContent xmlns:mc="http://schemas.openxmlformats.org/markup-compatibility/2006">
+    <mc:Choice xmlns:c14="http://schemas.microsoft.com/office/drawing/2007/8/2/chart" Requires="c14">
+      <c14:style val="102"/>
+    </mc:Choice>
+    <mc:Fallback>
+      <c:style val="2"/>
+    </mc:Fallback>
+  </mc:AlternateContent>
+  <c:chart>
+    <c:title>
+      <c:tx>
+        <c:rich>
+          <a:bodyPr rot="0" spcFirstLastPara="1" vertOverflow="ellipsis" vert="horz" wrap="square" anchor="ctr" anchorCtr="1"/>
+          <a:lstStyle/>
+          <a:p>
+            <a:pPr>
+              <a:defRPr sz="1862" b="0" i="0" u="none" strike="noStrike" kern="1200" spc="0" baseline="0">
+                <a:solidFill>
+                  <a:schemeClr val="tx1">
+                    <a:lumMod val="65000"/>
+                    <a:lumOff val="35000"/>
+                  </a:schemeClr>
+                </a:solidFill>
+                <a:latin typeface="+mn-lt"/>
+                <a:ea typeface="+mn-ea"/>
+                <a:cs typeface="+mn-cs"/>
+              </a:defRPr>
+            </a:pPr>
+            <a:r>
+              <a:rPr lang="en-US" dirty="0"/>
+              <a:t>Search Path</a:t>
+            </a:r>
+            <a:r>
+              <a:rPr lang="en-US" baseline="0" dirty="0"/>
+              <a:t> Length</a:t>
+            </a:r>
+            <a:endParaRPr lang="en-US" baseline="-25000" dirty="0"/>
+          </a:p>
+        </c:rich>
+      </c:tx>
+      <c:overlay val="0"/>
+      <c:spPr>
+        <a:noFill/>
+        <a:ln>
+          <a:noFill/>
+        </a:ln>
+        <a:effectLst/>
+      </c:spPr>
+    </c:title>
+    <c:autoTitleDeleted val="0"/>
+    <c:plotArea>
+      <c:layout/>
+      <c:lineChart>
+        <c:grouping val="standard"/>
+        <c:varyColors val="1"/>
+        <c:ser>
+          <c:idx val="0"/>
+          <c:order val="0"/>
+          <c:tx>
+            <c:strRef>
+              <c:f>Sheet1!$C$1</c:f>
+              <c:strCache>
+                <c:ptCount val="1"/>
+                <c:pt idx="0">
+                  <c:v>Search Length</c:v>
+                </c:pt>
+              </c:strCache>
+            </c:strRef>
+          </c:tx>
+          <c:spPr>
+            <a:ln w="28575" cap="rnd">
+              <a:solidFill>
+                <a:schemeClr val="accent2"/>
+              </a:solidFill>
+              <a:round/>
+            </a:ln>
+            <a:effectLst/>
+          </c:spPr>
+          <c:marker>
+            <c:symbol val="circle"/>
+            <c:size val="5"/>
+            <c:spPr>
+              <a:solidFill>
+                <a:schemeClr val="accent2"/>
+              </a:solidFill>
+              <a:ln w="9525">
+                <a:solidFill>
+                  <a:schemeClr val="accent2"/>
+                </a:solidFill>
+              </a:ln>
+              <a:effectLst/>
+            </c:spPr>
+          </c:marker>
+          <c:dLbls>
+            <c:spPr>
+              <a:noFill/>
+              <a:ln>
+                <a:noFill/>
+              </a:ln>
+              <a:effectLst/>
+            </c:spPr>
+            <c:dLblPos val="t"/>
+            <c:showLegendKey val="0"/>
+            <c:showVal val="1"/>
+            <c:showCatName val="0"/>
+            <c:showSerName val="0"/>
+            <c:showPercent val="0"/>
+            <c:showBubbleSize val="0"/>
+            <c:showLeaderLines val="0"/>
+            <c:extLst>
+              <c:ext xmlns:c15="http://schemas.microsoft.com/office/drawing/2012/chart" uri="{CE6537A1-D6FC-4f65-9D91-7224C49458BB}">
+                <c15:showLeaderLines val="1"/>
+              </c:ext>
+            </c:extLst>
+          </c:dLbls>
+          <c:cat>
+            <c:strRef>
+              <c:f>Sheet1!$A$2:$A$11</c:f>
+              <c:strCache>
+                <c:ptCount val="10"/>
+                <c:pt idx="0">
+                  <c:v>2x2</c:v>
+                </c:pt>
+                <c:pt idx="1">
+                  <c:v>3x2</c:v>
+                </c:pt>
+                <c:pt idx="2">
+                  <c:v>3x3</c:v>
+                </c:pt>
+                <c:pt idx="3">
+                  <c:v>4x3</c:v>
+                </c:pt>
+                <c:pt idx="4">
+                  <c:v>4x4</c:v>
+                </c:pt>
+                <c:pt idx="5">
+                  <c:v>5x4</c:v>
+                </c:pt>
+                <c:pt idx="6">
+                  <c:v>5x5</c:v>
+                </c:pt>
+                <c:pt idx="7">
+                  <c:v>6x5</c:v>
+                </c:pt>
+                <c:pt idx="8">
+                  <c:v>6x6</c:v>
+                </c:pt>
+                <c:pt idx="9">
+                  <c:v>7x6</c:v>
+                </c:pt>
+              </c:strCache>
+            </c:strRef>
+          </c:cat>
+          <c:val>
+            <c:numRef>
+              <c:f>Sheet1!$C$2:$C$11</c:f>
+              <c:numCache>
+                <c:formatCode>General</c:formatCode>
+                <c:ptCount val="10"/>
+                <c:pt idx="0">
+                  <c:v>4</c:v>
+                </c:pt>
+                <c:pt idx="1">
+                  <c:v>15</c:v>
+                </c:pt>
+                <c:pt idx="2">
+                  <c:v>351</c:v>
+                </c:pt>
+                <c:pt idx="3">
+                  <c:v>3555</c:v>
+                </c:pt>
+                <c:pt idx="4">
+                  <c:v>9314</c:v>
+                </c:pt>
+                <c:pt idx="5">
+                  <c:v>9408</c:v>
+                </c:pt>
+                <c:pt idx="6">
+                  <c:v>9706</c:v>
+                </c:pt>
+                <c:pt idx="7">
+                  <c:v>9241</c:v>
+                </c:pt>
+                <c:pt idx="8">
+                  <c:v>9167</c:v>
+                </c:pt>
+                <c:pt idx="9">
+                  <c:v>8555</c:v>
+                </c:pt>
+              </c:numCache>
+            </c:numRef>
+          </c:val>
+          <c:smooth val="0"/>
+          <c:extLst>
+            <c:ext xmlns:c16="http://schemas.microsoft.com/office/drawing/2014/chart" uri="{C3380CC4-5D6E-409C-BE32-E72D297353CC}">
+              <c16:uniqueId val="{00000009-D376-46B2-AD73-7C9269BF225F}"/>
+            </c:ext>
+          </c:extLst>
+        </c:ser>
+        <c:dLbls>
+          <c:dLblPos val="t"/>
+          <c:showLegendKey val="0"/>
+          <c:showVal val="1"/>
+          <c:showCatName val="0"/>
+          <c:showSerName val="0"/>
+          <c:showPercent val="0"/>
+          <c:showBubbleSize val="0"/>
+        </c:dLbls>
+        <c:marker val="1"/>
+        <c:smooth val="0"/>
+        <c:axId val="487448632"/>
+        <c:axId val="487450272"/>
+      </c:lineChart>
+      <c:catAx>
+        <c:axId val="487448632"/>
+        <c:scaling>
+          <c:orientation val="minMax"/>
+        </c:scaling>
+        <c:delete val="0"/>
+        <c:axPos val="b"/>
+        <c:numFmt formatCode="General" sourceLinked="1"/>
+        <c:majorTickMark val="none"/>
+        <c:minorTickMark val="none"/>
+        <c:tickLblPos val="nextTo"/>
+        <c:spPr>
+          <a:noFill/>
+          <a:ln w="9525" cap="flat" cmpd="sng" algn="ctr">
+            <a:solidFill>
+              <a:schemeClr val="tx1">
+                <a:lumMod val="15000"/>
+                <a:lumOff val="85000"/>
+              </a:schemeClr>
+            </a:solidFill>
+            <a:round/>
+          </a:ln>
+          <a:effectLst/>
+        </c:spPr>
+        <c:txPr>
+          <a:bodyPr rot="-60000000" spcFirstLastPara="1" vertOverflow="ellipsis" vert="horz" wrap="square" anchor="ctr" anchorCtr="1"/>
+          <a:lstStyle/>
+          <a:p>
+            <a:pPr>
+              <a:defRPr sz="1197" b="0" i="0" u="none" strike="noStrike" kern="1200" baseline="0">
+                <a:solidFill>
+                  <a:schemeClr val="tx1">
+                    <a:lumMod val="65000"/>
+                    <a:lumOff val="35000"/>
+                  </a:schemeClr>
+                </a:solidFill>
+                <a:latin typeface="+mn-lt"/>
+                <a:ea typeface="+mn-ea"/>
+                <a:cs typeface="+mn-cs"/>
+              </a:defRPr>
+            </a:pPr>
+            <a:endParaRPr lang="en-US"/>
+          </a:p>
+        </c:txPr>
+        <c:crossAx val="487450272"/>
+        <c:crosses val="autoZero"/>
+        <c:auto val="1"/>
+        <c:lblAlgn val="ctr"/>
+        <c:lblOffset val="100"/>
+        <c:noMultiLvlLbl val="0"/>
+      </c:catAx>
+      <c:valAx>
+        <c:axId val="487450272"/>
+        <c:scaling>
+          <c:orientation val="minMax"/>
+        </c:scaling>
+        <c:delete val="0"/>
+        <c:axPos val="l"/>
+        <c:numFmt formatCode="General" sourceLinked="1"/>
+        <c:majorTickMark val="none"/>
+        <c:minorTickMark val="none"/>
+        <c:tickLblPos val="nextTo"/>
+        <c:spPr>
+          <a:noFill/>
+          <a:ln>
+            <a:noFill/>
+          </a:ln>
+          <a:effectLst/>
+        </c:spPr>
+        <c:txPr>
+          <a:bodyPr rot="-60000000" spcFirstLastPara="1" vertOverflow="ellipsis" vert="horz" wrap="square" anchor="ctr" anchorCtr="1"/>
+          <a:lstStyle/>
+          <a:p>
+            <a:pPr>
+              <a:defRPr sz="1197" b="0" i="0" u="none" strike="noStrike" kern="1200" baseline="0">
+                <a:solidFill>
+                  <a:schemeClr val="tx1">
+                    <a:lumMod val="65000"/>
+                    <a:lumOff val="35000"/>
+                  </a:schemeClr>
+                </a:solidFill>
+                <a:latin typeface="+mn-lt"/>
+                <a:ea typeface="+mn-ea"/>
+                <a:cs typeface="+mn-cs"/>
+              </a:defRPr>
+            </a:pPr>
+            <a:endParaRPr lang="en-US"/>
+          </a:p>
+        </c:txPr>
+        <c:crossAx val="487448632"/>
+        <c:crosses val="autoZero"/>
+        <c:crossBetween val="between"/>
+      </c:valAx>
+      <c:spPr>
+        <a:noFill/>
+        <a:ln>
+          <a:noFill/>
+        </a:ln>
+        <a:effectLst/>
+      </c:spPr>
+    </c:plotArea>
+    <c:plotVisOnly val="1"/>
+    <c:dispBlanksAs val="gap"/>
+    <c:extLst>
+      <c:ext xmlns:c16r3="http://schemas.microsoft.com/office/drawing/2017/03/chart" uri="{56B9EC1D-385E-4148-901F-78D8002777C0}">
+        <c16r3:dataDisplayOptions16>
+          <c16r3:dispNaAsBlank val="1"/>
+        </c16r3:dataDisplayOptions16>
+      </c:ext>
+    </c:extLst>
+    <c:showDLblsOverMax val="0"/>
+  </c:chart>
+  <c:spPr>
+    <a:noFill/>
+    <a:ln>
+      <a:solidFill>
+        <a:schemeClr val="accent3">
+          <a:lumMod val="75000"/>
+        </a:schemeClr>
+      </a:solidFill>
+    </a:ln>
+    <a:effectLst/>
+  </c:spPr>
+  <c:txPr>
+    <a:bodyPr/>
+    <a:lstStyle/>
+    <a:p>
+      <a:pPr>
+        <a:defRPr/>
+      </a:pPr>
+      <a:endParaRPr lang="en-US"/>
+    </a:p>
+  </c:txPr>
+  <c:externalData r:id="rId1">
+    <c:autoUpdate val="0"/>
+  </c:externalData>
+</c:chartSpace>
+</file>
+
+<file path=ppt/charts/chart8.xml><?xml version="1.0" encoding="utf-8"?>
+<c:chartSpace xmlns:c="http://schemas.openxmlformats.org/drawingml/2006/chart" xmlns:a="http://schemas.openxmlformats.org/drawingml/2006/main" xmlns:r="http://schemas.openxmlformats.org/officeDocument/2006/relationships" xmlns:c16r2="http://schemas.microsoft.com/office/drawing/2015/06/chart">
+  <c:date1904 val="0"/>
+  <c:lang val="en-US"/>
+  <c:roundedCorners val="0"/>
+  <mc:AlternateContent xmlns:mc="http://schemas.openxmlformats.org/markup-compatibility/2006">
+    <mc:Choice xmlns:c14="http://schemas.microsoft.com/office/drawing/2007/8/2/chart" Requires="c14">
+      <c14:style val="102"/>
+    </mc:Choice>
+    <mc:Fallback>
+      <c:style val="2"/>
+    </mc:Fallback>
+  </mc:AlternateContent>
+  <c:chart>
+    <c:title>
+      <c:tx>
+        <c:rich>
+          <a:bodyPr rot="0" spcFirstLastPara="1" vertOverflow="ellipsis" vert="horz" wrap="square" anchor="ctr" anchorCtr="1"/>
+          <a:lstStyle/>
+          <a:p>
+            <a:pPr>
+              <a:defRPr sz="1862" b="0" i="0" u="none" strike="noStrike" kern="1200" spc="0" baseline="0">
+                <a:solidFill>
+                  <a:schemeClr val="tx1">
+                    <a:lumMod val="65000"/>
+                    <a:lumOff val="35000"/>
+                  </a:schemeClr>
+                </a:solidFill>
+                <a:latin typeface="+mn-lt"/>
+                <a:ea typeface="+mn-ea"/>
+                <a:cs typeface="+mn-cs"/>
+              </a:defRPr>
+            </a:pPr>
+            <a:r>
+              <a:rPr lang="en-US" dirty="0"/>
+              <a:t>Solution</a:t>
+            </a:r>
+            <a:r>
+              <a:rPr lang="en-US" baseline="0" dirty="0"/>
+              <a:t> Path Length</a:t>
+            </a:r>
+            <a:endParaRPr lang="en-US" baseline="-25000" dirty="0"/>
+          </a:p>
+        </c:rich>
+      </c:tx>
+      <c:overlay val="0"/>
+      <c:spPr>
+        <a:noFill/>
+        <a:ln>
+          <a:noFill/>
+        </a:ln>
+        <a:effectLst/>
+      </c:spPr>
+    </c:title>
+    <c:autoTitleDeleted val="0"/>
+    <c:plotArea>
+      <c:layout/>
+      <c:lineChart>
+        <c:grouping val="standard"/>
+        <c:varyColors val="1"/>
+        <c:ser>
+          <c:idx val="0"/>
+          <c:order val="0"/>
+          <c:tx>
+            <c:strRef>
+              <c:f>Sheet1!$D$1</c:f>
+              <c:strCache>
+                <c:ptCount val="1"/>
+                <c:pt idx="0">
+                  <c:v>Solution Length</c:v>
+                </c:pt>
+              </c:strCache>
+            </c:strRef>
+          </c:tx>
+          <c:spPr>
+            <a:ln>
+              <a:solidFill>
+                <a:schemeClr val="accent1">
+                  <a:lumMod val="60000"/>
+                  <a:lumOff val="40000"/>
+                </a:schemeClr>
+              </a:solidFill>
+            </a:ln>
+          </c:spPr>
+          <c:marker>
+            <c:symbol val="circle"/>
+            <c:size val="5"/>
+            <c:spPr>
+              <a:solidFill>
+                <a:schemeClr val="accent1">
+                  <a:lumMod val="75000"/>
+                </a:schemeClr>
+              </a:solidFill>
+              <a:ln w="9525">
+                <a:solidFill>
+                  <a:schemeClr val="accent1">
+                    <a:lumMod val="60000"/>
+                    <a:lumOff val="40000"/>
+                  </a:schemeClr>
+                </a:solidFill>
+              </a:ln>
+              <a:effectLst/>
+            </c:spPr>
+          </c:marker>
+          <c:dLbls>
+            <c:spPr>
+              <a:noFill/>
+              <a:ln>
+                <a:noFill/>
+              </a:ln>
+              <a:effectLst/>
+            </c:spPr>
+            <c:dLblPos val="t"/>
+            <c:showLegendKey val="0"/>
+            <c:showVal val="1"/>
+            <c:showCatName val="0"/>
+            <c:showSerName val="0"/>
+            <c:showPercent val="0"/>
+            <c:showBubbleSize val="0"/>
+            <c:showLeaderLines val="0"/>
+            <c:extLst>
+              <c:ext xmlns:c15="http://schemas.microsoft.com/office/drawing/2012/chart" uri="{CE6537A1-D6FC-4f65-9D91-7224C49458BB}">
+                <c15:showLeaderLines val="1"/>
+              </c:ext>
+            </c:extLst>
+          </c:dLbls>
+          <c:cat>
+            <c:strRef>
+              <c:f>Sheet1!$A$2:$A$11</c:f>
+              <c:strCache>
+                <c:ptCount val="10"/>
+                <c:pt idx="0">
+                  <c:v>2x2</c:v>
+                </c:pt>
+                <c:pt idx="1">
+                  <c:v>3x2</c:v>
+                </c:pt>
+                <c:pt idx="2">
+                  <c:v>3x3</c:v>
+                </c:pt>
+                <c:pt idx="3">
+                  <c:v>4x3</c:v>
+                </c:pt>
+                <c:pt idx="4">
+                  <c:v>4x4</c:v>
+                </c:pt>
+                <c:pt idx="5">
+                  <c:v>5x4</c:v>
+                </c:pt>
+                <c:pt idx="6">
+                  <c:v>5x5</c:v>
+                </c:pt>
+                <c:pt idx="7">
+                  <c:v>6x5</c:v>
+                </c:pt>
+                <c:pt idx="8">
+                  <c:v>6x6</c:v>
+                </c:pt>
+                <c:pt idx="9">
+                  <c:v>7x6</c:v>
+                </c:pt>
+              </c:strCache>
+            </c:strRef>
+          </c:cat>
+          <c:val>
+            <c:numRef>
+              <c:f>Sheet1!$D$2:$D$11</c:f>
+              <c:numCache>
+                <c:formatCode>General</c:formatCode>
+                <c:ptCount val="10"/>
+                <c:pt idx="0">
+                  <c:v>4</c:v>
+                </c:pt>
+                <c:pt idx="1">
+                  <c:v>7</c:v>
+                </c:pt>
+                <c:pt idx="2">
+                  <c:v>15</c:v>
+                </c:pt>
+                <c:pt idx="3">
+                  <c:v>24</c:v>
+                </c:pt>
+                <c:pt idx="4">
+                  <c:v>0</c:v>
+                </c:pt>
+                <c:pt idx="5">
+                  <c:v>0</c:v>
+                </c:pt>
+                <c:pt idx="6">
+                  <c:v>0</c:v>
+                </c:pt>
+                <c:pt idx="7">
+                  <c:v>0</c:v>
+                </c:pt>
+                <c:pt idx="8">
+                  <c:v>0</c:v>
+                </c:pt>
+                <c:pt idx="9">
+                  <c:v>0</c:v>
+                </c:pt>
+              </c:numCache>
+            </c:numRef>
+          </c:val>
+          <c:smooth val="0"/>
+          <c:extLst>
+            <c:ext xmlns:c16="http://schemas.microsoft.com/office/drawing/2014/chart" uri="{C3380CC4-5D6E-409C-BE32-E72D297353CC}">
+              <c16:uniqueId val="{00000000-ABE1-4ED2-B191-61F7346529DD}"/>
+            </c:ext>
+          </c:extLst>
+        </c:ser>
+        <c:dLbls>
+          <c:dLblPos val="t"/>
+          <c:showLegendKey val="0"/>
+          <c:showVal val="1"/>
+          <c:showCatName val="0"/>
+          <c:showSerName val="0"/>
+          <c:showPercent val="0"/>
+          <c:showBubbleSize val="0"/>
+        </c:dLbls>
+        <c:marker val="1"/>
+        <c:smooth val="0"/>
+        <c:axId val="487448632"/>
+        <c:axId val="487450272"/>
+      </c:lineChart>
+      <c:catAx>
+        <c:axId val="487448632"/>
+        <c:scaling>
+          <c:orientation val="minMax"/>
+        </c:scaling>
+        <c:delete val="0"/>
+        <c:axPos val="b"/>
+        <c:numFmt formatCode="General" sourceLinked="1"/>
+        <c:majorTickMark val="none"/>
+        <c:minorTickMark val="none"/>
+        <c:tickLblPos val="nextTo"/>
+        <c:spPr>
+          <a:noFill/>
+          <a:ln w="9525" cap="flat" cmpd="sng" algn="ctr">
+            <a:solidFill>
+              <a:schemeClr val="tx1">
+                <a:lumMod val="15000"/>
+                <a:lumOff val="85000"/>
+              </a:schemeClr>
+            </a:solidFill>
+            <a:round/>
+          </a:ln>
+          <a:effectLst/>
+        </c:spPr>
+        <c:txPr>
+          <a:bodyPr rot="-60000000" spcFirstLastPara="1" vertOverflow="ellipsis" vert="horz" wrap="square" anchor="ctr" anchorCtr="1"/>
+          <a:lstStyle/>
+          <a:p>
+            <a:pPr>
+              <a:defRPr sz="1197" b="0" i="0" u="none" strike="noStrike" kern="1200" baseline="0">
+                <a:solidFill>
+                  <a:schemeClr val="tx1">
+                    <a:lumMod val="65000"/>
+                    <a:lumOff val="35000"/>
+                  </a:schemeClr>
+                </a:solidFill>
+                <a:latin typeface="+mn-lt"/>
+                <a:ea typeface="+mn-ea"/>
+                <a:cs typeface="+mn-cs"/>
+              </a:defRPr>
+            </a:pPr>
+            <a:endParaRPr lang="en-US"/>
+          </a:p>
+        </c:txPr>
+        <c:crossAx val="487450272"/>
+        <c:crosses val="autoZero"/>
+        <c:auto val="1"/>
+        <c:lblAlgn val="ctr"/>
+        <c:lblOffset val="100"/>
+        <c:noMultiLvlLbl val="0"/>
+      </c:catAx>
+      <c:valAx>
+        <c:axId val="487450272"/>
+        <c:scaling>
+          <c:orientation val="minMax"/>
+        </c:scaling>
+        <c:delete val="0"/>
+        <c:axPos val="l"/>
+        <c:numFmt formatCode="General" sourceLinked="1"/>
+        <c:majorTickMark val="none"/>
+        <c:minorTickMark val="none"/>
+        <c:tickLblPos val="nextTo"/>
+        <c:spPr>
+          <a:noFill/>
+          <a:ln>
+            <a:noFill/>
+          </a:ln>
+          <a:effectLst/>
+        </c:spPr>
+        <c:txPr>
+          <a:bodyPr rot="-60000000" spcFirstLastPara="1" vertOverflow="ellipsis" vert="horz" wrap="square" anchor="ctr" anchorCtr="1"/>
+          <a:lstStyle/>
+          <a:p>
+            <a:pPr>
+              <a:defRPr sz="1197" b="0" i="0" u="none" strike="noStrike" kern="1200" baseline="0">
+                <a:solidFill>
+                  <a:schemeClr val="tx1">
+                    <a:lumMod val="65000"/>
+                    <a:lumOff val="35000"/>
+                  </a:schemeClr>
+                </a:solidFill>
+                <a:latin typeface="+mn-lt"/>
+                <a:ea typeface="+mn-ea"/>
+                <a:cs typeface="+mn-cs"/>
+              </a:defRPr>
+            </a:pPr>
+            <a:endParaRPr lang="en-US"/>
+          </a:p>
+        </c:txPr>
+        <c:crossAx val="487448632"/>
+        <c:crosses val="autoZero"/>
+        <c:crossBetween val="between"/>
+      </c:valAx>
+      <c:spPr>
+        <a:noFill/>
+        <a:ln>
+          <a:noFill/>
+        </a:ln>
+        <a:effectLst/>
+      </c:spPr>
+    </c:plotArea>
+    <c:plotVisOnly val="1"/>
+    <c:dispBlanksAs val="gap"/>
+    <c:extLst>
+      <c:ext xmlns:c16r3="http://schemas.microsoft.com/office/drawing/2017/03/chart" uri="{56B9EC1D-385E-4148-901F-78D8002777C0}">
+        <c16r3:dataDisplayOptions16>
+          <c16r3:dispNaAsBlank val="1"/>
+        </c16r3:dataDisplayOptions16>
+      </c:ext>
+    </c:extLst>
+    <c:showDLblsOverMax val="0"/>
+  </c:chart>
+  <c:spPr>
+    <a:noFill/>
+    <a:ln>
+      <a:solidFill>
+        <a:schemeClr val="accent3">
+          <a:lumMod val="75000"/>
+        </a:schemeClr>
+      </a:solidFill>
+    </a:ln>
+    <a:effectLst/>
+  </c:spPr>
+  <c:txPr>
+    <a:bodyPr/>
+    <a:lstStyle/>
+    <a:p>
+      <a:pPr>
+        <a:defRPr/>
+      </a:pPr>
+      <a:endParaRPr lang="en-US"/>
+    </a:p>
+  </c:txPr>
+  <c:externalData r:id="rId1">
     <c:autoUpdate val="0"/>
   </c:externalData>
 </c:chartSpace>
@@ -5590,7 +6752,7 @@
           <a:p>
             <a:fld id="{EA0C0817-A112-4847-8014-A94B7D2A4EA3}" type="datetime1">
               <a:rPr lang="en-US" smtClean="0"/>
-              <a:t>2020-11-15</a:t>
+              <a:t>2020-11-16</a:t>
             </a:fld>
             <a:endParaRPr lang="en-US" dirty="0"/>
           </a:p>
@@ -5792,7 +6954,7 @@
           <a:p>
             <a:fld id="{7332B432-ACDA-4023-A761-2BAB76577B62}" type="datetime1">
               <a:rPr lang="en-US" smtClean="0"/>
-              <a:t>2020-11-15</a:t>
+              <a:t>2020-11-16</a:t>
             </a:fld>
             <a:endParaRPr lang="en-US" dirty="0"/>
           </a:p>
@@ -6391,7 +7553,7 @@
           <a:p>
             <a:fld id="{D9C646AA-F36E-4540-911D-FFFC0A0EF24A}" type="datetime1">
               <a:rPr lang="en-US" smtClean="0"/>
-              <a:t>2020-11-15</a:t>
+              <a:t>2020-11-16</a:t>
             </a:fld>
             <a:endParaRPr lang="en-US" dirty="0"/>
           </a:p>
@@ -6711,7 +7873,7 @@
           <a:p>
             <a:fld id="{69186D26-FA5F-4637-B602-B7C2DC34CFD4}" type="datetime1">
               <a:rPr lang="en-US" smtClean="0"/>
-              <a:t>2020-11-15</a:t>
+              <a:t>2020-11-16</a:t>
             </a:fld>
             <a:endParaRPr lang="en-US" dirty="0"/>
           </a:p>
@@ -7148,7 +8310,7 @@
           <a:p>
             <a:fld id="{8A7F15D8-96D1-4781-BC50-CA8A088B2FE4}" type="datetime1">
               <a:rPr lang="en-US" smtClean="0"/>
-              <a:t>2020-11-15</a:t>
+              <a:t>2020-11-16</a:t>
             </a:fld>
             <a:endParaRPr lang="en-US" dirty="0"/>
           </a:p>
@@ -7266,7 +8428,7 @@
           <a:p>
             <a:fld id="{F9A96C99-B8F8-4528-BD05-0E16E943DC09}" type="datetime1">
               <a:rPr lang="en-US" smtClean="0"/>
-              <a:t>2020-11-15</a:t>
+              <a:t>2020-11-16</a:t>
             </a:fld>
             <a:endParaRPr lang="en-US" dirty="0"/>
           </a:p>
@@ -7361,7 +8523,7 @@
           <a:p>
             <a:fld id="{03636942-C211-4B28-8DBD-C953E00AF71B}" type="datetime1">
               <a:rPr lang="en-US" smtClean="0"/>
-              <a:t>2020-11-15</a:t>
+              <a:t>2020-11-16</a:t>
             </a:fld>
             <a:endParaRPr lang="en-US" dirty="0"/>
           </a:p>
@@ -7778,7 +8940,7 @@
           <a:p>
             <a:fld id="{7E8D12A6-918A-48BD-8CB9-CA713993B0EA}" type="datetime1">
               <a:rPr lang="en-US" smtClean="0"/>
-              <a:t>2020-11-15</a:t>
+              <a:t>2020-11-16</a:t>
             </a:fld>
             <a:endParaRPr lang="en-US" dirty="0"/>
           </a:p>
@@ -8040,7 +9202,7 @@
             <a:fld id="{E778CE86-875F-4587-BCF6-FA054AFC0D53}" type="datetime1">
               <a:rPr lang="en-US" smtClean="0"/>
               <a:pPr/>
-              <a:t>2020-11-15</a:t>
+              <a:t>2020-11-16</a:t>
             </a:fld>
             <a:endParaRPr lang="en-US" dirty="0"/>
           </a:p>
@@ -8556,7 +9718,7 @@
           <a:p>
             <a:fld id="{F6FA2B21-3FCD-4721-B95C-427943F61125}" type="datetime1">
               <a:rPr lang="en-US" smtClean="0"/>
-              <a:t>2020-11-15</a:t>
+              <a:t>2020-11-16</a:t>
             </a:fld>
             <a:endParaRPr lang="en-US" dirty="0"/>
           </a:p>
@@ -9360,7 +10522,7 @@
           <p:nvPr>
             <p:extLst>
               <p:ext uri="{D42A27DB-BD31-4B8C-83A1-F6EECF244321}">
-                <p14:modId xmlns:p14="http://schemas.microsoft.com/office/powerpoint/2010/main" val="637874982"/>
+                <p14:modId xmlns:p14="http://schemas.microsoft.com/office/powerpoint/2010/main" val="3685145957"/>
               </p:ext>
             </p:extLst>
           </p:nvPr>
@@ -9447,7 +10609,7 @@
           <p:nvPr>
             <p:extLst>
               <p:ext uri="{D42A27DB-BD31-4B8C-83A1-F6EECF244321}">
-                <p14:modId xmlns:p14="http://schemas.microsoft.com/office/powerpoint/2010/main" val="1798631655"/>
+                <p14:modId xmlns:p14="http://schemas.microsoft.com/office/powerpoint/2010/main" val="1052282724"/>
               </p:ext>
             </p:extLst>
           </p:nvPr>
@@ -9534,7 +10696,7 @@
           <p:nvPr>
             <p:extLst>
               <p:ext uri="{D42A27DB-BD31-4B8C-83A1-F6EECF244321}">
-                <p14:modId xmlns:p14="http://schemas.microsoft.com/office/powerpoint/2010/main" val="235625260"/>
+                <p14:modId xmlns:p14="http://schemas.microsoft.com/office/powerpoint/2010/main" val="2850956529"/>
               </p:ext>
             </p:extLst>
           </p:nvPr>
@@ -9621,7 +10783,7 @@
           <p:nvPr>
             <p:extLst>
               <p:ext uri="{D42A27DB-BD31-4B8C-83A1-F6EECF244321}">
-                <p14:modId xmlns:p14="http://schemas.microsoft.com/office/powerpoint/2010/main" val="1594266624"/>
+                <p14:modId xmlns:p14="http://schemas.microsoft.com/office/powerpoint/2010/main" val="1183703041"/>
               </p:ext>
             </p:extLst>
           </p:nvPr>
@@ -9682,7 +10844,12 @@
             <p:ph type="title"/>
           </p:nvPr>
         </p:nvSpPr>
-        <p:spPr/>
+        <p:spPr>
+          <a:xfrm>
+            <a:off x="1066800" y="555508"/>
+            <a:ext cx="10058400" cy="1371600"/>
+          </a:xfrm>
+        </p:spPr>
         <p:txBody>
           <a:bodyPr/>
           <a:lstStyle/>
@@ -9694,31 +10861,494 @@
           </a:p>
         </p:txBody>
       </p:sp>
-      <p:sp>
-        <p:nvSpPr>
-          <p:cNvPr id="3" name="Content Placeholder 2">
+      <p:graphicFrame>
+        <p:nvGraphicFramePr>
+          <p:cNvPr id="4" name="Table 4">
             <a:extLst>
               <a:ext uri="{FF2B5EF4-FFF2-40B4-BE49-F238E27FC236}">
-                <a16:creationId xmlns:a16="http://schemas.microsoft.com/office/drawing/2014/main" id="{8F4727E7-3D17-480D-8AB1-20B4B90FBCC9}"/>
+                <a16:creationId xmlns:a16="http://schemas.microsoft.com/office/drawing/2014/main" id="{CF93FB4C-18FF-4035-8350-69FBA7D78362}"/>
               </a:ext>
             </a:extLst>
           </p:cNvPr>
-          <p:cNvSpPr>
-            <a:spLocks noGrp="1"/>
-          </p:cNvSpPr>
+          <p:cNvGraphicFramePr>
+            <a:graphicFrameLocks noGrp="1"/>
+          </p:cNvGraphicFramePr>
           <p:nvPr>
-            <p:ph idx="1"/>
+            <p:extLst>
+              <p:ext uri="{D42A27DB-BD31-4B8C-83A1-F6EECF244321}">
+                <p14:modId xmlns:p14="http://schemas.microsoft.com/office/powerpoint/2010/main" val="1948790367"/>
+              </p:ext>
+            </p:extLst>
           </p:nvPr>
-        </p:nvSpPr>
-        <p:spPr/>
-        <p:txBody>
-          <a:bodyPr/>
-          <a:lstStyle/>
-          <a:p>
-            <a:endParaRPr lang="en-US" dirty="0"/>
-          </a:p>
-        </p:txBody>
-      </p:sp>
+        </p:nvGraphicFramePr>
+        <p:xfrm>
+          <a:off x="1066800" y="1927108"/>
+          <a:ext cx="10058400" cy="4132750"/>
+        </p:xfrm>
+        <a:graphic>
+          <a:graphicData uri="http://schemas.openxmlformats.org/drawingml/2006/table">
+            <a:tbl>
+              <a:tblPr firstRow="1" bandRow="1">
+                <a:tableStyleId>{5940675A-B579-460E-94D1-54222C63F5DA}</a:tableStyleId>
+              </a:tblPr>
+              <a:tblGrid>
+                <a:gridCol w="2011680">
+                  <a:extLst>
+                    <a:ext uri="{9D8B030D-6E8A-4147-A177-3AD203B41FA5}">
+                      <a16:colId xmlns:a16="http://schemas.microsoft.com/office/drawing/2014/main" val="1464132688"/>
+                    </a:ext>
+                  </a:extLst>
+                </a:gridCol>
+                <a:gridCol w="2011680">
+                  <a:extLst>
+                    <a:ext uri="{9D8B030D-6E8A-4147-A177-3AD203B41FA5}">
+                      <a16:colId xmlns:a16="http://schemas.microsoft.com/office/drawing/2014/main" val="3161285647"/>
+                    </a:ext>
+                  </a:extLst>
+                </a:gridCol>
+                <a:gridCol w="2011680">
+                  <a:extLst>
+                    <a:ext uri="{9D8B030D-6E8A-4147-A177-3AD203B41FA5}">
+                      <a16:colId xmlns:a16="http://schemas.microsoft.com/office/drawing/2014/main" val="997468290"/>
+                    </a:ext>
+                  </a:extLst>
+                </a:gridCol>
+                <a:gridCol w="2011680">
+                  <a:extLst>
+                    <a:ext uri="{9D8B030D-6E8A-4147-A177-3AD203B41FA5}">
+                      <a16:colId xmlns:a16="http://schemas.microsoft.com/office/drawing/2014/main" val="2117328982"/>
+                    </a:ext>
+                  </a:extLst>
+                </a:gridCol>
+                <a:gridCol w="2011680">
+                  <a:extLst>
+                    <a:ext uri="{9D8B030D-6E8A-4147-A177-3AD203B41FA5}">
+                      <a16:colId xmlns:a16="http://schemas.microsoft.com/office/drawing/2014/main" val="3784932127"/>
+                    </a:ext>
+                  </a:extLst>
+                </a:gridCol>
+              </a:tblGrid>
+              <a:tr h="414190">
+                <a:tc>
+                  <a:txBody>
+                    <a:bodyPr/>
+                    <a:lstStyle/>
+                    <a:p>
+                      <a:pPr algn="ctr"/>
+                      <a:r>
+                        <a:rPr lang="en-US" dirty="0"/>
+                        <a:t>Uniform Cost</a:t>
+                      </a:r>
+                    </a:p>
+                  </a:txBody>
+                  <a:tcPr/>
+                </a:tc>
+                <a:tc>
+                  <a:txBody>
+                    <a:bodyPr/>
+                    <a:lstStyle/>
+                    <a:p>
+                      <a:pPr algn="ctr"/>
+                      <a:r>
+                        <a:rPr lang="en-US" dirty="0"/>
+                        <a:t>GBFS-H1</a:t>
+                      </a:r>
+                    </a:p>
+                  </a:txBody>
+                  <a:tcPr/>
+                </a:tc>
+                <a:tc>
+                  <a:txBody>
+                    <a:bodyPr/>
+                    <a:lstStyle/>
+                    <a:p>
+                      <a:pPr algn="ctr"/>
+                      <a:r>
+                        <a:rPr lang="en-US" dirty="0"/>
+                        <a:t>GBFS-H2</a:t>
+                      </a:r>
+                    </a:p>
+                  </a:txBody>
+                  <a:tcPr/>
+                </a:tc>
+                <a:tc>
+                  <a:txBody>
+                    <a:bodyPr/>
+                    <a:lstStyle/>
+                    <a:p>
+                      <a:pPr algn="ctr"/>
+                      <a:r>
+                        <a:rPr lang="en-US" dirty="0"/>
+                        <a:t>ASTAR-H1</a:t>
+                      </a:r>
+                    </a:p>
+                  </a:txBody>
+                  <a:tcPr/>
+                </a:tc>
+                <a:tc>
+                  <a:txBody>
+                    <a:bodyPr/>
+                    <a:lstStyle/>
+                    <a:p>
+                      <a:pPr algn="ctr"/>
+                      <a:r>
+                        <a:rPr lang="en-US" dirty="0"/>
+                        <a:t>ASTAR-H2</a:t>
+                      </a:r>
+                    </a:p>
+                  </a:txBody>
+                  <a:tcPr/>
+                </a:tc>
+                <a:extLst>
+                  <a:ext uri="{0D108BD9-81ED-4DB2-BD59-A6C34878D82A}">
+                    <a16:rowId xmlns:a16="http://schemas.microsoft.com/office/drawing/2014/main" val="2723075250"/>
+                  </a:ext>
+                </a:extLst>
+              </a:tr>
+              <a:tr h="3658908">
+                <a:tc>
+                  <a:txBody>
+                    <a:bodyPr/>
+                    <a:lstStyle/>
+                    <a:p>
+                      <a:pPr marL="285750" indent="-285750">
+                        <a:buFontTx/>
+                        <a:buChar char="-"/>
+                      </a:pPr>
+                      <a:r>
+                        <a:rPr lang="en-US" sz="1400" dirty="0"/>
+                        <a:t>Fairly short (not much data to reference, therefore inaccurate)</a:t>
+                      </a:r>
+                    </a:p>
+                    <a:p>
+                      <a:pPr marL="285750" indent="-285750">
+                        <a:buFontTx/>
+                        <a:buChar char="-"/>
+                      </a:pPr>
+                      <a:r>
+                        <a:rPr lang="en-US" sz="1400" dirty="0"/>
+                        <a:t>Low average cost (again, inaccurate due to small sample size)</a:t>
+                      </a:r>
+                    </a:p>
+                    <a:p>
+                      <a:pPr marL="285750" indent="-285750">
+                        <a:buFontTx/>
+                        <a:buChar char="-"/>
+                      </a:pPr>
+                      <a:endParaRPr lang="en-US" sz="1400" dirty="0"/>
+                    </a:p>
+                    <a:p>
+                      <a:pPr marL="285750" indent="-285750">
+                        <a:buFontTx/>
+                        <a:buChar char="-"/>
+                      </a:pPr>
+                      <a:r>
+                        <a:rPr lang="en-US" sz="1400" dirty="0"/>
+                        <a:t>Based on the puzzles that were actually solved, solution paths are optimal.</a:t>
+                      </a:r>
+                    </a:p>
+                    <a:p>
+                      <a:pPr marL="285750" indent="-285750">
+                        <a:buFontTx/>
+                        <a:buChar char="-"/>
+                      </a:pPr>
+                      <a:endParaRPr lang="en-US" sz="1400" dirty="0"/>
+                    </a:p>
+                  </a:txBody>
+                  <a:tcPr/>
+                </a:tc>
+                <a:tc>
+                  <a:txBody>
+                    <a:bodyPr/>
+                    <a:lstStyle/>
+                    <a:p>
+                      <a:pPr marL="285750" indent="-285750">
+                        <a:buFontTx/>
+                        <a:buChar char="-"/>
+                      </a:pPr>
+                      <a:r>
+                        <a:rPr lang="en-US" sz="1400" dirty="0"/>
+                        <a:t>Fairly long</a:t>
+                      </a:r>
+                    </a:p>
+                    <a:p>
+                      <a:pPr marL="285750" indent="-285750">
+                        <a:buFontTx/>
+                        <a:buChar char="-"/>
+                      </a:pPr>
+                      <a:r>
+                        <a:rPr lang="en-US" sz="1400" dirty="0"/>
+                        <a:t>Highest cost</a:t>
+                      </a:r>
+                    </a:p>
+                    <a:p>
+                      <a:pPr marL="285750" indent="-285750">
+                        <a:buFontTx/>
+                        <a:buChar char="-"/>
+                      </a:pPr>
+                      <a:endParaRPr lang="en-US" sz="1400" dirty="0"/>
+                    </a:p>
+                    <a:p>
+                      <a:pPr marL="285750" indent="-285750">
+                        <a:buFontTx/>
+                        <a:buChar char="-"/>
+                      </a:pPr>
+                      <a:r>
+                        <a:rPr lang="en-US" sz="1400" dirty="0"/>
+                        <a:t>Worst resulting optimality of solution paths (excluding UCS)</a:t>
+                      </a:r>
+                    </a:p>
+                    <a:p>
+                      <a:pPr marL="285750" indent="-285750">
+                        <a:buFontTx/>
+                        <a:buChar char="-"/>
+                      </a:pPr>
+                      <a:r>
+                        <a:rPr lang="en-US" sz="1400" dirty="0"/>
+                        <a:t>H1 produced slightly less optimal solution paths due to it being less informed</a:t>
+                      </a:r>
+                    </a:p>
+                    <a:p>
+                      <a:pPr marL="285750" indent="-285750">
+                        <a:buFontTx/>
+                        <a:buChar char="-"/>
+                      </a:pPr>
+                      <a:r>
+                        <a:rPr lang="en-US" sz="1400" dirty="0"/>
+                        <a:t>GFBS does not use g(n) so the costs will be higher than A*</a:t>
+                      </a:r>
+                    </a:p>
+                  </a:txBody>
+                  <a:tcPr/>
+                </a:tc>
+                <a:tc>
+                  <a:txBody>
+                    <a:bodyPr/>
+                    <a:lstStyle/>
+                    <a:p>
+                      <a:pPr marL="285750" lvl="0" indent="-285750">
+                        <a:buFontTx/>
+                        <a:buChar char="-"/>
+                      </a:pPr>
+                      <a:r>
+                        <a:rPr lang="en-US" sz="1400" dirty="0"/>
+                        <a:t>Longest length</a:t>
+                      </a:r>
+                    </a:p>
+                    <a:p>
+                      <a:pPr marL="285750" lvl="0" indent="-285750">
+                        <a:buFontTx/>
+                        <a:buChar char="-"/>
+                      </a:pPr>
+                      <a:r>
+                        <a:rPr lang="en-US" sz="1400" dirty="0"/>
+                        <a:t>Average cost</a:t>
+                      </a:r>
+                    </a:p>
+                    <a:p>
+                      <a:pPr marL="285750" lvl="0" indent="-285750">
+                        <a:buFontTx/>
+                        <a:buChar char="-"/>
+                      </a:pPr>
+                      <a:endParaRPr lang="en-US" sz="1400" dirty="0"/>
+                    </a:p>
+                    <a:p>
+                      <a:pPr marL="285750" lvl="0" indent="-285750">
+                        <a:buFontTx/>
+                        <a:buChar char="-"/>
+                      </a:pPr>
+                      <a:r>
+                        <a:rPr lang="en-US" sz="1400" dirty="0"/>
+                        <a:t>Second worst optimality of solution paths (excluding UCS)</a:t>
+                      </a:r>
+                    </a:p>
+                    <a:p>
+                      <a:pPr marL="285750" lvl="0" indent="-285750">
+                        <a:buFontTx/>
+                        <a:buChar char="-"/>
+                      </a:pPr>
+                      <a:r>
+                        <a:rPr lang="en-US" sz="1400" dirty="0"/>
+                        <a:t>H2 produced slightly more optimal solution paths due to it being more informed</a:t>
+                      </a:r>
+                    </a:p>
+                    <a:p>
+                      <a:pPr marL="285750" marR="0" lvl="0" indent="-285750" algn="l" defTabSz="914400" rtl="0" eaLnBrk="1" fontAlgn="auto" latinLnBrk="0" hangingPunct="1">
+                        <a:lnSpc>
+                          <a:spcPct val="100000"/>
+                        </a:lnSpc>
+                        <a:spcBef>
+                          <a:spcPts val="0"/>
+                        </a:spcBef>
+                        <a:spcAft>
+                          <a:spcPts val="0"/>
+                        </a:spcAft>
+                        <a:buClrTx/>
+                        <a:buSzTx/>
+                        <a:buFontTx/>
+                        <a:buChar char="-"/>
+                        <a:tabLst/>
+                        <a:defRPr/>
+                      </a:pPr>
+                      <a:r>
+                        <a:rPr lang="en-US" sz="1400" dirty="0"/>
+                        <a:t>GFBS does not use g(n) so the costs will be higher than A*</a:t>
+                      </a:r>
+                    </a:p>
+                  </a:txBody>
+                  <a:tcPr/>
+                </a:tc>
+                <a:tc>
+                  <a:txBody>
+                    <a:bodyPr/>
+                    <a:lstStyle/>
+                    <a:p>
+                      <a:pPr marL="285750" indent="-285750">
+                        <a:buFontTx/>
+                        <a:buChar char="-"/>
+                      </a:pPr>
+                      <a:r>
+                        <a:rPr lang="en-US" sz="1400" dirty="0"/>
+                        <a:t>Fairly short</a:t>
+                      </a:r>
+                    </a:p>
+                    <a:p>
+                      <a:pPr marL="285750" indent="-285750">
+                        <a:buFontTx/>
+                        <a:buChar char="-"/>
+                      </a:pPr>
+                      <a:r>
+                        <a:rPr lang="en-US" sz="1400" dirty="0"/>
+                        <a:t>Average cost</a:t>
+                      </a:r>
+                    </a:p>
+                    <a:p>
+                      <a:pPr marL="285750" indent="-285750">
+                        <a:buFontTx/>
+                        <a:buChar char="-"/>
+                      </a:pPr>
+                      <a:endParaRPr lang="en-US" sz="1400" dirty="0"/>
+                    </a:p>
+                    <a:p>
+                      <a:pPr marL="285750" indent="-285750">
+                        <a:buFontTx/>
+                        <a:buChar char="-"/>
+                      </a:pPr>
+                      <a:r>
+                        <a:rPr lang="en-US" sz="1400" dirty="0"/>
+                        <a:t>Second best optimality of solution paths (excluding UCS)</a:t>
+                      </a:r>
+                    </a:p>
+                    <a:p>
+                      <a:pPr marL="285750" indent="-285750">
+                        <a:buFontTx/>
+                        <a:buChar char="-"/>
+                      </a:pPr>
+                      <a:r>
+                        <a:rPr lang="en-US" sz="1400" dirty="0"/>
+                        <a:t>H1 produced slightly less optimal solution paths due to it being less informed</a:t>
+                      </a:r>
+                    </a:p>
+                    <a:p>
+                      <a:pPr marL="285750" indent="-285750">
+                        <a:buFontTx/>
+                        <a:buChar char="-"/>
+                      </a:pPr>
+                      <a:r>
+                        <a:rPr lang="en-US" sz="1400" dirty="0"/>
+                        <a:t>A* uses g(n) which is why it had lower costs over GBFS</a:t>
+                      </a:r>
+                    </a:p>
+                  </a:txBody>
+                  <a:tcPr/>
+                </a:tc>
+                <a:tc>
+                  <a:txBody>
+                    <a:bodyPr/>
+                    <a:lstStyle/>
+                    <a:p>
+                      <a:pPr marL="285750" indent="-285750">
+                        <a:buFontTx/>
+                        <a:buChar char="-"/>
+                      </a:pPr>
+                      <a:r>
+                        <a:rPr lang="en-US" sz="1400" dirty="0"/>
+                        <a:t>Shortest length</a:t>
+                      </a:r>
+                    </a:p>
+                    <a:p>
+                      <a:pPr marL="285750" indent="-285750">
+                        <a:buFontTx/>
+                        <a:buChar char="-"/>
+                      </a:pPr>
+                      <a:r>
+                        <a:rPr lang="en-US" sz="1400" dirty="0"/>
+                        <a:t>Lowest cost</a:t>
+                      </a:r>
+                    </a:p>
+                    <a:p>
+                      <a:pPr marL="285750" indent="-285750">
+                        <a:buFontTx/>
+                        <a:buChar char="-"/>
+                      </a:pPr>
+                      <a:endParaRPr lang="en-US" sz="1400" dirty="0"/>
+                    </a:p>
+                    <a:p>
+                      <a:pPr marL="285750" indent="-285750">
+                        <a:buFontTx/>
+                        <a:buChar char="-"/>
+                      </a:pPr>
+                      <a:r>
+                        <a:rPr lang="en-US" sz="1400" dirty="0"/>
+                        <a:t>Best resulting optimality of solution paths (excluding UCS)</a:t>
+                      </a:r>
+                    </a:p>
+                    <a:p>
+                      <a:pPr marL="285750" indent="-285750">
+                        <a:buFontTx/>
+                        <a:buChar char="-"/>
+                      </a:pPr>
+                      <a:r>
+                        <a:rPr lang="en-US" sz="1400" dirty="0"/>
+                        <a:t>H2 produced slightly more optimal solution paths due to it being more informed</a:t>
+                      </a:r>
+                    </a:p>
+                    <a:p>
+                      <a:pPr marL="285750" marR="0" lvl="0" indent="-285750" algn="l" defTabSz="914400" rtl="0" eaLnBrk="1" fontAlgn="auto" latinLnBrk="0" hangingPunct="1">
+                        <a:lnSpc>
+                          <a:spcPct val="100000"/>
+                        </a:lnSpc>
+                        <a:spcBef>
+                          <a:spcPts val="0"/>
+                        </a:spcBef>
+                        <a:spcAft>
+                          <a:spcPts val="0"/>
+                        </a:spcAft>
+                        <a:buClrTx/>
+                        <a:buSzTx/>
+                        <a:buFontTx/>
+                        <a:buChar char="-"/>
+                        <a:tabLst/>
+                        <a:defRPr/>
+                      </a:pPr>
+                      <a:r>
+                        <a:rPr lang="en-US" sz="1400" dirty="0"/>
+                        <a:t>A* uses g(n) which is why it had lower costs over GBFS</a:t>
+                      </a:r>
+                    </a:p>
+                  </a:txBody>
+                  <a:tcPr/>
+                </a:tc>
+                <a:extLst>
+                  <a:ext uri="{0D108BD9-81ED-4DB2-BD59-A6C34878D82A}">
+                    <a16:rowId xmlns:a16="http://schemas.microsoft.com/office/drawing/2014/main" val="2751262620"/>
+                  </a:ext>
+                </a:extLst>
+              </a:tr>
+            </a:tbl>
+          </a:graphicData>
+        </a:graphic>
+      </p:graphicFrame>
     </p:spTree>
     <p:extLst>
       <p:ext uri="{BB962C8B-B14F-4D97-AF65-F5344CB8AC3E}">
@@ -9770,6 +11400,7 @@
           <a:bodyPr/>
           <a:lstStyle/>
           <a:p>
+            <a:pPr algn="ctr"/>
             <a:r>
               <a:rPr lang="en-US" dirty="0"/>
               <a:t>Our “Best” Performing Algorithm</a:t>
@@ -9793,7 +11424,12 @@
             <p:ph idx="1"/>
           </p:nvPr>
         </p:nvSpPr>
-        <p:spPr/>
+        <p:spPr>
+          <a:xfrm>
+            <a:off x="1066800" y="2206312"/>
+            <a:ext cx="10058400" cy="367165"/>
+          </a:xfrm>
+        </p:spPr>
         <p:txBody>
           <a:bodyPr/>
           <a:lstStyle/>
@@ -9803,36 +11439,584 @@
             </a:pPr>
             <a:r>
               <a:rPr lang="en-US" dirty="0"/>
-              <a:t>We decided that our “best” performing algorithm is A* using the second heuristic function.</a:t>
+              <a:t>We decided that our “best” performing algorithm is A* using H</a:t>
             </a:r>
-          </a:p>
-          <a:p>
-            <a:pPr marL="0" indent="0" algn="ctr">
+            <a:r>
+              <a:rPr lang="en-US" baseline="-25000" dirty="0"/>
+              <a:t>2</a:t>
+            </a:r>
+            <a:endParaRPr lang="en-US" dirty="0"/>
+          </a:p>
+        </p:txBody>
+      </p:sp>
+      <p:sp>
+        <p:nvSpPr>
+          <p:cNvPr id="9" name="Content Placeholder 2">
+            <a:extLst>
+              <a:ext uri="{FF2B5EF4-FFF2-40B4-BE49-F238E27FC236}">
+                <a16:creationId xmlns:a16="http://schemas.microsoft.com/office/drawing/2014/main" id="{C6BBF583-9753-4775-B552-A1C5EFD23FBB}"/>
+              </a:ext>
+            </a:extLst>
+          </p:cNvPr>
+          <p:cNvSpPr txBox="1">
+            <a:spLocks/>
+          </p:cNvSpPr>
+          <p:nvPr/>
+        </p:nvSpPr>
+        <p:spPr>
+          <a:xfrm>
+            <a:off x="1066800" y="3499926"/>
+            <a:ext cx="10058400" cy="2569948"/>
+          </a:xfrm>
+          <a:prstGeom prst="rect">
+            <a:avLst/>
+          </a:prstGeom>
+        </p:spPr>
+        <p:txBody>
+          <a:bodyPr vert="horz" lIns="91440" tIns="45720" rIns="91440" bIns="45720" rtlCol="0">
+            <a:normAutofit/>
+          </a:bodyPr>
+          <a:lstStyle>
+            <a:lvl1pPr marL="182880" indent="-182880" algn="l" defTabSz="914400" rtl="0" eaLnBrk="1" latinLnBrk="0" hangingPunct="1">
+              <a:lnSpc>
+                <a:spcPct val="110000"/>
+              </a:lnSpc>
+              <a:spcBef>
+                <a:spcPts val="900"/>
+              </a:spcBef>
+              <a:spcAft>
+                <a:spcPts val="0"/>
+              </a:spcAft>
+              <a:buClr>
+                <a:schemeClr val="tx1">
+                  <a:lumMod val="85000"/>
+                  <a:lumOff val="15000"/>
+                </a:schemeClr>
+              </a:buClr>
+              <a:buFont typeface="Garamond" pitchFamily="18" charset="0"/>
+              <a:buChar char="◦"/>
+              <a:defRPr sz="1500" kern="1200">
+                <a:solidFill>
+                  <a:schemeClr val="tx1"/>
+                </a:solidFill>
+                <a:latin typeface="+mn-lt"/>
+                <a:ea typeface="+mn-ea"/>
+                <a:cs typeface="+mn-cs"/>
+              </a:defRPr>
+            </a:lvl1pPr>
+            <a:lvl2pPr marL="457200" indent="-182880" algn="l" defTabSz="914400" rtl="0" eaLnBrk="1" latinLnBrk="0" hangingPunct="1">
+              <a:lnSpc>
+                <a:spcPct val="100000"/>
+              </a:lnSpc>
+              <a:spcBef>
+                <a:spcPts val="500"/>
+              </a:spcBef>
+              <a:buClr>
+                <a:schemeClr val="tx1">
+                  <a:lumMod val="85000"/>
+                  <a:lumOff val="15000"/>
+                </a:schemeClr>
+              </a:buClr>
+              <a:buFont typeface="Garamond" pitchFamily="18" charset="0"/>
+              <a:buChar char="◦"/>
+              <a:defRPr sz="1300" kern="1200">
+                <a:solidFill>
+                  <a:schemeClr val="tx1"/>
+                </a:solidFill>
+                <a:latin typeface="+mn-lt"/>
+                <a:ea typeface="+mn-ea"/>
+                <a:cs typeface="+mn-cs"/>
+              </a:defRPr>
+            </a:lvl2pPr>
+            <a:lvl3pPr marL="731520" indent="-182880" algn="l" defTabSz="914400" rtl="0" eaLnBrk="1" latinLnBrk="0" hangingPunct="1">
+              <a:lnSpc>
+                <a:spcPct val="100000"/>
+              </a:lnSpc>
+              <a:spcBef>
+                <a:spcPts val="500"/>
+              </a:spcBef>
+              <a:buClr>
+                <a:schemeClr val="tx1">
+                  <a:lumMod val="85000"/>
+                  <a:lumOff val="15000"/>
+                </a:schemeClr>
+              </a:buClr>
+              <a:buFont typeface="Garamond" pitchFamily="18" charset="0"/>
+              <a:buChar char="◦"/>
+              <a:defRPr sz="1200" kern="1200">
+                <a:solidFill>
+                  <a:schemeClr val="tx1"/>
+                </a:solidFill>
+                <a:latin typeface="+mn-lt"/>
+                <a:ea typeface="+mn-ea"/>
+                <a:cs typeface="+mn-cs"/>
+              </a:defRPr>
+            </a:lvl3pPr>
+            <a:lvl4pPr marL="1005840" indent="-182880" algn="l" defTabSz="914400" rtl="0" eaLnBrk="1" latinLnBrk="0" hangingPunct="1">
+              <a:lnSpc>
+                <a:spcPct val="100000"/>
+              </a:lnSpc>
+              <a:spcBef>
+                <a:spcPts val="500"/>
+              </a:spcBef>
+              <a:buClr>
+                <a:schemeClr val="tx1">
+                  <a:lumMod val="85000"/>
+                  <a:lumOff val="15000"/>
+                </a:schemeClr>
+              </a:buClr>
+              <a:buFont typeface="Garamond" pitchFamily="18" charset="0"/>
+              <a:buChar char="◦"/>
+              <a:defRPr sz="1200" kern="1200">
+                <a:solidFill>
+                  <a:schemeClr val="tx1"/>
+                </a:solidFill>
+                <a:latin typeface="+mn-lt"/>
+                <a:ea typeface="+mn-ea"/>
+                <a:cs typeface="+mn-cs"/>
+              </a:defRPr>
+            </a:lvl4pPr>
+            <a:lvl5pPr marL="1280160" indent="-182880" algn="l" defTabSz="914400" rtl="0" eaLnBrk="1" latinLnBrk="0" hangingPunct="1">
+              <a:lnSpc>
+                <a:spcPct val="100000"/>
+              </a:lnSpc>
+              <a:spcBef>
+                <a:spcPts val="500"/>
+              </a:spcBef>
+              <a:buClr>
+                <a:schemeClr val="tx1">
+                  <a:lumMod val="85000"/>
+                  <a:lumOff val="15000"/>
+                </a:schemeClr>
+              </a:buClr>
+              <a:buFont typeface="Garamond" pitchFamily="18" charset="0"/>
+              <a:buChar char="◦"/>
+              <a:defRPr sz="1200" kern="1200">
+                <a:solidFill>
+                  <a:schemeClr val="tx1"/>
+                </a:solidFill>
+                <a:latin typeface="+mn-lt"/>
+                <a:ea typeface="+mn-ea"/>
+                <a:cs typeface="+mn-cs"/>
+              </a:defRPr>
+            </a:lvl5pPr>
+            <a:lvl6pPr marL="1600000" indent="-228600" algn="l" defTabSz="914400" rtl="0" eaLnBrk="1" latinLnBrk="0" hangingPunct="1">
+              <a:lnSpc>
+                <a:spcPct val="100000"/>
+              </a:lnSpc>
+              <a:spcBef>
+                <a:spcPts val="500"/>
+              </a:spcBef>
+              <a:buClr>
+                <a:schemeClr val="tx1">
+                  <a:lumMod val="85000"/>
+                  <a:lumOff val="15000"/>
+                </a:schemeClr>
+              </a:buClr>
+              <a:buFont typeface="Garamond" pitchFamily="18" charset="0"/>
+              <a:buChar char="◦"/>
+              <a:defRPr sz="1400" kern="1200">
+                <a:solidFill>
+                  <a:schemeClr val="tx1"/>
+                </a:solidFill>
+                <a:latin typeface="+mn-lt"/>
+                <a:ea typeface="+mn-ea"/>
+                <a:cs typeface="+mn-cs"/>
+              </a:defRPr>
+            </a:lvl6pPr>
+            <a:lvl7pPr marL="1900000" indent="-228600" algn="l" defTabSz="914400" rtl="0" eaLnBrk="1" latinLnBrk="0" hangingPunct="1">
+              <a:lnSpc>
+                <a:spcPct val="100000"/>
+              </a:lnSpc>
+              <a:spcBef>
+                <a:spcPts val="500"/>
+              </a:spcBef>
+              <a:buClr>
+                <a:schemeClr val="tx1">
+                  <a:lumMod val="85000"/>
+                  <a:lumOff val="15000"/>
+                </a:schemeClr>
+              </a:buClr>
+              <a:buFont typeface="Garamond" pitchFamily="18" charset="0"/>
+              <a:buChar char="◦"/>
+              <a:defRPr sz="1400" kern="1200">
+                <a:solidFill>
+                  <a:schemeClr val="tx1"/>
+                </a:solidFill>
+                <a:latin typeface="+mn-lt"/>
+                <a:ea typeface="+mn-ea"/>
+                <a:cs typeface="+mn-cs"/>
+              </a:defRPr>
+            </a:lvl7pPr>
+            <a:lvl8pPr marL="2200000" indent="-228600" algn="l" defTabSz="914400" rtl="0" eaLnBrk="1" latinLnBrk="0" hangingPunct="1">
+              <a:lnSpc>
+                <a:spcPct val="100000"/>
+              </a:lnSpc>
+              <a:spcBef>
+                <a:spcPts val="500"/>
+              </a:spcBef>
+              <a:buClr>
+                <a:schemeClr val="tx1">
+                  <a:lumMod val="85000"/>
+                  <a:lumOff val="15000"/>
+                </a:schemeClr>
+              </a:buClr>
+              <a:buFont typeface="Garamond" pitchFamily="18" charset="0"/>
+              <a:buChar char="◦"/>
+              <a:defRPr sz="1400" kern="1200">
+                <a:solidFill>
+                  <a:schemeClr val="tx1"/>
+                </a:solidFill>
+                <a:latin typeface="+mn-lt"/>
+                <a:ea typeface="+mn-ea"/>
+                <a:cs typeface="+mn-cs"/>
+              </a:defRPr>
+            </a:lvl8pPr>
+            <a:lvl9pPr marL="2500000" indent="-228600" algn="l" defTabSz="914400" rtl="0" eaLnBrk="1" latinLnBrk="0" hangingPunct="1">
+              <a:lnSpc>
+                <a:spcPct val="100000"/>
+              </a:lnSpc>
+              <a:spcBef>
+                <a:spcPts val="500"/>
+              </a:spcBef>
+              <a:buClr>
+                <a:schemeClr val="tx1">
+                  <a:lumMod val="85000"/>
+                  <a:lumOff val="15000"/>
+                </a:schemeClr>
+              </a:buClr>
+              <a:buFont typeface="Garamond" pitchFamily="18" charset="0"/>
+              <a:buChar char="◦"/>
+              <a:defRPr sz="1400" kern="1200">
+                <a:solidFill>
+                  <a:schemeClr val="tx1"/>
+                </a:solidFill>
+                <a:latin typeface="+mn-lt"/>
+                <a:ea typeface="+mn-ea"/>
+                <a:cs typeface="+mn-cs"/>
+              </a:defRPr>
+            </a:lvl9pPr>
+          </a:lstStyle>
+          <a:p>
+            <a:r>
+              <a:rPr lang="en-US" dirty="0"/>
+              <a:t>Had the best average solution path length and cost (most optimal solution paths were found)</a:t>
+            </a:r>
+          </a:p>
+          <a:p>
+            <a:r>
+              <a:rPr lang="en-US" dirty="0"/>
+              <a:t>Was also the quick to execute (even compared to GBFS)</a:t>
+            </a:r>
+          </a:p>
+          <a:p>
+            <a:r>
+              <a:rPr lang="en-US" dirty="0"/>
+              <a:t>Resulted in ALL puzzles being solved (i.e. no “no solutions” or timeouts)</a:t>
+            </a:r>
+          </a:p>
+          <a:p>
+            <a:r>
+              <a:rPr lang="en-US" dirty="0"/>
+              <a:t>Very reasonable search paths, especially compared to A* using H</a:t>
+            </a:r>
+            <a:r>
+              <a:rPr lang="en-US" baseline="-25000" dirty="0"/>
+              <a:t>1</a:t>
+            </a:r>
+          </a:p>
+          <a:p>
+            <a:endParaRPr lang="en-US" dirty="0"/>
+          </a:p>
+          <a:p>
+            <a:pPr marL="0" indent="0">
+              <a:buFont typeface="Garamond" pitchFamily="18" charset="0"/>
               <a:buNone/>
             </a:pPr>
             <a:endParaRPr lang="en-US" dirty="0"/>
           </a:p>
-          <a:p>
-            <a:pPr marL="0" indent="0">
-              <a:buNone/>
+        </p:txBody>
+      </p:sp>
+      <p:cxnSp>
+        <p:nvCxnSpPr>
+          <p:cNvPr id="11" name="Straight Connector 10">
+            <a:extLst>
+              <a:ext uri="{FF2B5EF4-FFF2-40B4-BE49-F238E27FC236}">
+                <a16:creationId xmlns:a16="http://schemas.microsoft.com/office/drawing/2014/main" id="{AE33747F-58F0-4366-8D9F-FC6FFF87FBB1}"/>
+              </a:ext>
+            </a:extLst>
+          </p:cNvPr>
+          <p:cNvCxnSpPr/>
+          <p:nvPr/>
+        </p:nvCxnSpPr>
+        <p:spPr>
+          <a:xfrm>
+            <a:off x="1066800" y="3021876"/>
+            <a:ext cx="10058400" cy="0"/>
+          </a:xfrm>
+          <a:prstGeom prst="line">
+            <a:avLst/>
+          </a:prstGeom>
+        </p:spPr>
+        <p:style>
+          <a:lnRef idx="1">
+            <a:schemeClr val="accent3"/>
+          </a:lnRef>
+          <a:fillRef idx="0">
+            <a:schemeClr val="accent3"/>
+          </a:fillRef>
+          <a:effectRef idx="0">
+            <a:schemeClr val="accent3"/>
+          </a:effectRef>
+          <a:fontRef idx="minor">
+            <a:schemeClr val="tx1"/>
+          </a:fontRef>
+        </p:style>
+      </p:cxnSp>
+    </p:spTree>
+    <p:extLst>
+      <p:ext uri="{BB962C8B-B14F-4D97-AF65-F5344CB8AC3E}">
+        <p14:creationId xmlns:p14="http://schemas.microsoft.com/office/powerpoint/2010/main" val="3898601898"/>
+      </p:ext>
+    </p:extLst>
+  </p:cSld>
+  <p:clrMapOvr>
+    <a:masterClrMapping/>
+  </p:clrMapOvr>
+</p:sld>
+</file>
+
+<file path=ppt/slides/slide16.xml><?xml version="1.0" encoding="utf-8"?>
+<p:sld xmlns:a="http://schemas.openxmlformats.org/drawingml/2006/main" xmlns:r="http://schemas.openxmlformats.org/officeDocument/2006/relationships" xmlns:p="http://schemas.openxmlformats.org/presentationml/2006/main">
+  <p:cSld>
+    <p:spTree>
+      <p:nvGrpSpPr>
+        <p:cNvPr id="1" name=""/>
+        <p:cNvGrpSpPr/>
+        <p:nvPr/>
+      </p:nvGrpSpPr>
+      <p:grpSpPr>
+        <a:xfrm>
+          <a:off x="0" y="0"/>
+          <a:ext cx="0" cy="0"/>
+          <a:chOff x="0" y="0"/>
+          <a:chExt cx="0" cy="0"/>
+        </a:xfrm>
+      </p:grpSpPr>
+      <p:sp>
+        <p:nvSpPr>
+          <p:cNvPr id="2" name="Title 1">
+            <a:extLst>
+              <a:ext uri="{FF2B5EF4-FFF2-40B4-BE49-F238E27FC236}">
+                <a16:creationId xmlns:a16="http://schemas.microsoft.com/office/drawing/2014/main" id="{34A7DF87-181E-43E3-9668-3498826797B8}"/>
+              </a:ext>
+            </a:extLst>
+          </p:cNvPr>
+          <p:cNvSpPr>
+            <a:spLocks noGrp="1"/>
+          </p:cNvSpPr>
+          <p:nvPr>
+            <p:ph type="title"/>
+          </p:nvPr>
+        </p:nvSpPr>
+        <p:spPr>
+          <a:xfrm>
+            <a:off x="735874" y="475053"/>
+            <a:ext cx="5207725" cy="1371600"/>
+          </a:xfrm>
+        </p:spPr>
+        <p:txBody>
+          <a:bodyPr/>
+          <a:lstStyle/>
+          <a:p>
+            <a:r>
+              <a:rPr lang="en-US" dirty="0"/>
+              <a:t>Scaling Up – Tests</a:t>
+            </a:r>
+            <a:br>
+              <a:rPr lang="en-US" dirty="0"/>
+            </a:br>
+            <a:r>
+              <a:rPr lang="en-US" dirty="0"/>
+              <a:t>with A* using H</a:t>
+            </a:r>
+            <a:r>
+              <a:rPr lang="en-US" baseline="-25000" dirty="0"/>
+              <a:t>2</a:t>
+            </a:r>
+          </a:p>
+        </p:txBody>
+      </p:sp>
+      <p:graphicFrame>
+        <p:nvGraphicFramePr>
+          <p:cNvPr id="5" name="Chart 4">
+            <a:extLst>
+              <a:ext uri="{FF2B5EF4-FFF2-40B4-BE49-F238E27FC236}">
+                <a16:creationId xmlns:a16="http://schemas.microsoft.com/office/drawing/2014/main" id="{DAB9876A-69B1-4F05-BE2A-EBF4405F8227}"/>
+              </a:ext>
+            </a:extLst>
+          </p:cNvPr>
+          <p:cNvGraphicFramePr/>
+          <p:nvPr>
+            <p:extLst>
+              <p:ext uri="{D42A27DB-BD31-4B8C-83A1-F6EECF244321}">
+                <p14:modId xmlns:p14="http://schemas.microsoft.com/office/powerpoint/2010/main" val="1340260242"/>
+              </p:ext>
+            </p:extLst>
+          </p:nvPr>
+        </p:nvGraphicFramePr>
+        <p:xfrm>
+          <a:off x="6096000" y="564217"/>
+          <a:ext cx="5360126" cy="2441938"/>
+        </p:xfrm>
+        <a:graphic>
+          <a:graphicData uri="http://schemas.openxmlformats.org/drawingml/2006/chart">
+            <c:chart xmlns:c="http://schemas.openxmlformats.org/drawingml/2006/chart" xmlns:r="http://schemas.openxmlformats.org/officeDocument/2006/relationships" r:id="rId2"/>
+          </a:graphicData>
+        </a:graphic>
+      </p:graphicFrame>
+      <p:graphicFrame>
+        <p:nvGraphicFramePr>
+          <p:cNvPr id="7" name="Chart 6">
+            <a:extLst>
+              <a:ext uri="{FF2B5EF4-FFF2-40B4-BE49-F238E27FC236}">
+                <a16:creationId xmlns:a16="http://schemas.microsoft.com/office/drawing/2014/main" id="{35524238-EC3A-4834-BDA9-CF7EB94656B5}"/>
+              </a:ext>
+            </a:extLst>
+          </p:cNvPr>
+          <p:cNvGraphicFramePr/>
+          <p:nvPr>
+            <p:extLst>
+              <p:ext uri="{D42A27DB-BD31-4B8C-83A1-F6EECF244321}">
+                <p14:modId xmlns:p14="http://schemas.microsoft.com/office/powerpoint/2010/main" val="3628203983"/>
+              </p:ext>
+            </p:extLst>
+          </p:nvPr>
+        </p:nvGraphicFramePr>
+        <p:xfrm>
+          <a:off x="6096000" y="3429000"/>
+          <a:ext cx="5360126" cy="2672714"/>
+        </p:xfrm>
+        <a:graphic>
+          <a:graphicData uri="http://schemas.openxmlformats.org/drawingml/2006/chart">
+            <c:chart xmlns:c="http://schemas.openxmlformats.org/drawingml/2006/chart" xmlns:r="http://schemas.openxmlformats.org/officeDocument/2006/relationships" r:id="rId3"/>
+          </a:graphicData>
+        </a:graphic>
+      </p:graphicFrame>
+      <p:graphicFrame>
+        <p:nvGraphicFramePr>
+          <p:cNvPr id="9" name="Chart 8">
+            <a:extLst>
+              <a:ext uri="{FF2B5EF4-FFF2-40B4-BE49-F238E27FC236}">
+                <a16:creationId xmlns:a16="http://schemas.microsoft.com/office/drawing/2014/main" id="{F3E258E5-D6A7-4764-AC5E-BBAB589F8353}"/>
+              </a:ext>
+            </a:extLst>
+          </p:cNvPr>
+          <p:cNvGraphicFramePr/>
+          <p:nvPr>
+            <p:extLst>
+              <p:ext uri="{D42A27DB-BD31-4B8C-83A1-F6EECF244321}">
+                <p14:modId xmlns:p14="http://schemas.microsoft.com/office/powerpoint/2010/main" val="3344389472"/>
+              </p:ext>
+            </p:extLst>
+          </p:nvPr>
+        </p:nvGraphicFramePr>
+        <p:xfrm>
+          <a:off x="735874" y="3429000"/>
+          <a:ext cx="5207725" cy="2672714"/>
+        </p:xfrm>
+        <a:graphic>
+          <a:graphicData uri="http://schemas.openxmlformats.org/drawingml/2006/chart">
+            <c:chart xmlns:c="http://schemas.openxmlformats.org/drawingml/2006/chart" xmlns:r="http://schemas.openxmlformats.org/officeDocument/2006/relationships" r:id="rId4"/>
+          </a:graphicData>
+        </a:graphic>
+      </p:graphicFrame>
+      <p:sp>
+        <p:nvSpPr>
+          <p:cNvPr id="10" name="TextBox 9">
+            <a:extLst>
+              <a:ext uri="{FF2B5EF4-FFF2-40B4-BE49-F238E27FC236}">
+                <a16:creationId xmlns:a16="http://schemas.microsoft.com/office/drawing/2014/main" id="{32D241AA-3B2A-475A-BBF9-160FA41AC912}"/>
+              </a:ext>
+            </a:extLst>
+          </p:cNvPr>
+          <p:cNvSpPr txBox="1"/>
+          <p:nvPr/>
+        </p:nvSpPr>
+        <p:spPr>
+          <a:xfrm>
+            <a:off x="653142" y="1865910"/>
+            <a:ext cx="5290457" cy="1600438"/>
+          </a:xfrm>
+          <a:prstGeom prst="rect">
+            <a:avLst/>
+          </a:prstGeom>
+          <a:noFill/>
+        </p:spPr>
+        <p:txBody>
+          <a:bodyPr wrap="square" rtlCol="0">
+            <a:spAutoFit/>
+          </a:bodyPr>
+          <a:lstStyle/>
+          <a:p>
+            <a:pPr marL="285750" indent="-285750">
+              <a:buFont typeface="Arial" panose="020B0604020202020204" pitchFamily="34" charset="0"/>
+              <a:buChar char="•"/>
             </a:pPr>
             <a:r>
-              <a:rPr lang="en-US" sz="2400" dirty="0"/>
-              <a:t>Scaling Up</a:t>
+              <a:rPr lang="en-US" sz="1400" dirty="0"/>
+              <a:t>Ten tests were performed, with a larger puzzle size each time, starting with a 2x2 puzzle</a:t>
             </a:r>
           </a:p>
           <a:p>
-            <a:pPr marL="0" indent="0">
-              <a:buNone/>
+            <a:pPr marL="285750" indent="-285750">
+              <a:buFont typeface="Arial" panose="020B0604020202020204" pitchFamily="34" charset="0"/>
+              <a:buChar char="•"/>
             </a:pPr>
-            <a:endParaRPr lang="en-US" dirty="0"/>
+            <a:r>
+              <a:rPr lang="en-US" sz="1400" dirty="0"/>
+              <a:t>A 60-minute timeout value was set</a:t>
+            </a:r>
+          </a:p>
+          <a:p>
+            <a:pPr marL="285750" indent="-285750">
+              <a:buFont typeface="Arial" panose="020B0604020202020204" pitchFamily="34" charset="0"/>
+              <a:buChar char="•"/>
+            </a:pPr>
+            <a:r>
+              <a:rPr lang="en-US" sz="1400" dirty="0"/>
+              <a:t>Execution times increased exponentially</a:t>
+            </a:r>
+          </a:p>
+          <a:p>
+            <a:pPr marL="285750" indent="-285750">
+              <a:buFont typeface="Arial" panose="020B0604020202020204" pitchFamily="34" charset="0"/>
+              <a:buChar char="•"/>
+            </a:pPr>
+            <a:r>
+              <a:rPr lang="en-US" sz="1400" dirty="0"/>
+              <a:t>Maximum solvable size seems to be ~4x3 puzzles</a:t>
+            </a:r>
+          </a:p>
+          <a:p>
+            <a:pPr marL="285750" indent="-285750">
+              <a:buFont typeface="Arial" panose="020B0604020202020204" pitchFamily="34" charset="0"/>
+              <a:buChar char="•"/>
+            </a:pPr>
+            <a:r>
+              <a:rPr lang="en-US" sz="1400" dirty="0"/>
+              <a:t>The time it takes to solve puzzles increases exponentially</a:t>
+            </a:r>
+          </a:p>
+          <a:p>
+            <a:endParaRPr lang="en-US" sz="1400" dirty="0"/>
           </a:p>
         </p:txBody>
       </p:sp>
     </p:spTree>
     <p:extLst>
       <p:ext uri="{BB962C8B-B14F-4D97-AF65-F5344CB8AC3E}">
-        <p14:creationId xmlns:p14="http://schemas.microsoft.com/office/powerpoint/2010/main" val="3898601898"/>
+        <p14:creationId xmlns:p14="http://schemas.microsoft.com/office/powerpoint/2010/main" val="686703230"/>
       </p:ext>
     </p:extLst>
   </p:cSld>
@@ -10166,6 +12350,27 @@
             <a:r>
               <a:rPr lang="en-US" dirty="0"/>
               <a:t>For the first heuristic, the “Hamming Distance” calculation was used</a:t>
+            </a:r>
+          </a:p>
+          <a:p>
+            <a:pPr lvl="1"/>
+            <a:r>
+              <a:rPr lang="en-US" dirty="0"/>
+              <a:t>The Hamming distance between two strings of equal length is the number of positions at which the corresponding symbols are different</a:t>
+            </a:r>
+          </a:p>
+          <a:p>
+            <a:pPr lvl="1"/>
+            <a:r>
+              <a:rPr lang="en-US" dirty="0"/>
+              <a:t>We adjusted the calculation by multiplying the resulting value by two when the state is not continuous (i.e. not in the form of 1[,2,3,4,5,6,7,0] for example)</a:t>
+            </a:r>
+          </a:p>
+          <a:p>
+            <a:pPr lvl="2"/>
+            <a:r>
+              <a:rPr lang="en-US" dirty="0"/>
+              <a:t>The reasoning behind this is to make the rather simple heuristic slightly more accurate to the actual cost, while keeping it admissible. </a:t>
             </a:r>
           </a:p>
         </p:txBody>
@@ -10431,6 +12636,13 @@
               <a:t>For the second heuristic, the “Manhattan Distance” calculation was used</a:t>
             </a:r>
           </a:p>
+          <a:p>
+            <a:pPr lvl="1"/>
+            <a:r>
+              <a:rPr lang="en-US" dirty="0"/>
+              <a:t>Manhattan distance is usually preferred over the more common Hamming Distance when there is high dimensionality in the data.</a:t>
+            </a:r>
+          </a:p>
         </p:txBody>
       </p:sp>
       <p:sp>
@@ -10449,8 +12661,8 @@
         </p:nvSpPr>
         <p:spPr>
           <a:xfrm>
-            <a:off x="1005840" y="4835098"/>
-            <a:ext cx="10119360" cy="1371601"/>
+            <a:off x="1005840" y="5295980"/>
+            <a:ext cx="10119360" cy="912559"/>
           </a:xfrm>
           <a:prstGeom prst="rect">
             <a:avLst/>
@@ -10769,7 +12981,7 @@
           <p:nvPr>
             <p:extLst>
               <p:ext uri="{D42A27DB-BD31-4B8C-83A1-F6EECF244321}">
-                <p14:modId xmlns:p14="http://schemas.microsoft.com/office/powerpoint/2010/main" val="1889647753"/>
+                <p14:modId xmlns:p14="http://schemas.microsoft.com/office/powerpoint/2010/main" val="400502514"/>
               </p:ext>
             </p:extLst>
           </p:nvPr>
@@ -10955,7 +13167,7 @@
                       <a:pPr algn="ctr"/>
                       <a:r>
                         <a:rPr lang="en-US" dirty="0"/>
-                        <a:t>59,652</a:t>
+                        <a:t>69,160</a:t>
                       </a:r>
                     </a:p>
                   </a:txBody>
@@ -10983,7 +13195,7 @@
                       <a:pPr algn="ctr"/>
                       <a:r>
                         <a:rPr lang="en-US" dirty="0"/>
-                        <a:t>2,927.24 s</a:t>
+                        <a:t>2909.44 s</a:t>
                       </a:r>
                     </a:p>
                   </a:txBody>
@@ -11014,7 +13226,7 @@
           <p:nvPr>
             <p:extLst>
               <p:ext uri="{D42A27DB-BD31-4B8C-83A1-F6EECF244321}">
-                <p14:modId xmlns:p14="http://schemas.microsoft.com/office/powerpoint/2010/main" val="2152224309"/>
+                <p14:modId xmlns:p14="http://schemas.microsoft.com/office/powerpoint/2010/main" val="3736292893"/>
               </p:ext>
             </p:extLst>
           </p:nvPr>
@@ -11172,7 +13384,7 @@
                       <a:pPr algn="ctr"/>
                       <a:r>
                         <a:rPr lang="en-US" dirty="0"/>
-                        <a:t>0.3</a:t>
+                        <a:t>7.5</a:t>
                       </a:r>
                     </a:p>
                   </a:txBody>
@@ -11200,7 +13412,7 @@
                       <a:pPr algn="ctr"/>
                       <a:r>
                         <a:rPr lang="en-US" dirty="0"/>
-                        <a:t>1,193.04</a:t>
+                        <a:t>34,580</a:t>
                       </a:r>
                     </a:p>
                   </a:txBody>
@@ -11214,7 +13426,7 @@
                       <a:pPr algn="ctr"/>
                       <a:r>
                         <a:rPr lang="en-US" dirty="0"/>
-                        <a:t>0.05</a:t>
+                        <a:t>1.13</a:t>
                       </a:r>
                     </a:p>
                   </a:txBody>
@@ -11228,7 +13440,7 @@
                       <a:pPr algn="ctr"/>
                       <a:r>
                         <a:rPr lang="en-US" dirty="0"/>
-                        <a:t>58.54 s</a:t>
+                        <a:t>58.19 s</a:t>
                       </a:r>
                     </a:p>
                   </a:txBody>
@@ -11352,7 +13564,7 @@
           <p:nvPr>
             <p:extLst>
               <p:ext uri="{D42A27DB-BD31-4B8C-83A1-F6EECF244321}">
-                <p14:modId xmlns:p14="http://schemas.microsoft.com/office/powerpoint/2010/main" val="2563233976"/>
+                <p14:modId xmlns:p14="http://schemas.microsoft.com/office/powerpoint/2010/main" val="1168135424"/>
               </p:ext>
             </p:extLst>
           </p:nvPr>
@@ -11552,7 +13764,7 @@
                       <a:pPr algn="ctr"/>
                       <a:r>
                         <a:rPr lang="en-US" dirty="0"/>
-                        <a:t>1,477</a:t>
+                        <a:t>1,475</a:t>
                       </a:r>
                     </a:p>
                   </a:txBody>
@@ -11566,7 +13778,7 @@
                       <a:pPr algn="ctr"/>
                       <a:r>
                         <a:rPr lang="en-US" dirty="0"/>
-                        <a:t>48.21 s</a:t>
+                        <a:t>49.48 s</a:t>
                       </a:r>
                     </a:p>
                   </a:txBody>
@@ -11597,7 +13809,7 @@
           <p:nvPr>
             <p:extLst>
               <p:ext uri="{D42A27DB-BD31-4B8C-83A1-F6EECF244321}">
-                <p14:modId xmlns:p14="http://schemas.microsoft.com/office/powerpoint/2010/main" val="2533720796"/>
+                <p14:modId xmlns:p14="http://schemas.microsoft.com/office/powerpoint/2010/main" val="3763531944"/>
               </p:ext>
             </p:extLst>
           </p:nvPr>
@@ -11811,7 +14023,7 @@
                       <a:pPr algn="ctr"/>
                       <a:r>
                         <a:rPr lang="en-US" dirty="0"/>
-                        <a:t>0.96 s</a:t>
+                        <a:t>0.99 s</a:t>
                       </a:r>
                     </a:p>
                   </a:txBody>
@@ -11947,7 +14159,7 @@
           <p:nvPr>
             <p:extLst>
               <p:ext uri="{D42A27DB-BD31-4B8C-83A1-F6EECF244321}">
-                <p14:modId xmlns:p14="http://schemas.microsoft.com/office/powerpoint/2010/main" val="4233302306"/>
+                <p14:modId xmlns:p14="http://schemas.microsoft.com/office/powerpoint/2010/main" val="3036670867"/>
               </p:ext>
             </p:extLst>
           </p:nvPr>
@@ -12161,7 +14373,7 @@
                       <a:pPr algn="ctr"/>
                       <a:r>
                         <a:rPr lang="en-US" dirty="0"/>
-                        <a:t>69.05 s</a:t>
+                        <a:t>69.99 s</a:t>
                       </a:r>
                     </a:p>
                   </a:txBody>
@@ -12192,7 +14404,7 @@
           <p:nvPr>
             <p:extLst>
               <p:ext uri="{D42A27DB-BD31-4B8C-83A1-F6EECF244321}">
-                <p14:modId xmlns:p14="http://schemas.microsoft.com/office/powerpoint/2010/main" val="707596605"/>
+                <p14:modId xmlns:p14="http://schemas.microsoft.com/office/powerpoint/2010/main" val="794486802"/>
               </p:ext>
             </p:extLst>
           </p:nvPr>
@@ -12406,7 +14618,7 @@
                       <a:pPr algn="ctr"/>
                       <a:r>
                         <a:rPr lang="en-US" dirty="0"/>
-                        <a:t>1.38 s</a:t>
+                        <a:t>1.40 s</a:t>
                       </a:r>
                     </a:p>
                   </a:txBody>
@@ -12542,7 +14754,7 @@
           <p:nvPr>
             <p:extLst>
               <p:ext uri="{D42A27DB-BD31-4B8C-83A1-F6EECF244321}">
-                <p14:modId xmlns:p14="http://schemas.microsoft.com/office/powerpoint/2010/main" val="1564868982"/>
+                <p14:modId xmlns:p14="http://schemas.microsoft.com/office/powerpoint/2010/main" val="2895227227"/>
               </p:ext>
             </p:extLst>
           </p:nvPr>
@@ -12700,7 +14912,7 @@
                       <a:pPr algn="ctr"/>
                       <a:r>
                         <a:rPr lang="en-US" dirty="0"/>
-                        <a:t>236</a:t>
+                        <a:t>544</a:t>
                       </a:r>
                     </a:p>
                   </a:txBody>
@@ -12714,7 +14926,7 @@
                       <a:pPr algn="ctr"/>
                       <a:r>
                         <a:rPr lang="en-US" dirty="0"/>
-                        <a:t>29</a:t>
+                        <a:t>5</a:t>
                       </a:r>
                     </a:p>
                   </a:txBody>
@@ -12728,7 +14940,7 @@
                       <a:pPr algn="ctr"/>
                       <a:r>
                         <a:rPr lang="en-US" dirty="0"/>
-                        <a:t>44,579</a:t>
+                        <a:t>17,398</a:t>
                       </a:r>
                     </a:p>
                   </a:txBody>
@@ -12742,7 +14954,7 @@
                       <a:pPr algn="ctr"/>
                       <a:r>
                         <a:rPr lang="en-US" dirty="0"/>
-                        <a:t>275</a:t>
+                        <a:t>691</a:t>
                       </a:r>
                     </a:p>
                   </a:txBody>
@@ -12756,7 +14968,7 @@
                       <a:pPr algn="ctr"/>
                       <a:r>
                         <a:rPr lang="en-US" dirty="0"/>
-                        <a:t>2,257.32 s</a:t>
+                        <a:t>663.28 s</a:t>
                       </a:r>
                     </a:p>
                   </a:txBody>
@@ -12787,7 +14999,7 @@
           <p:nvPr>
             <p:extLst>
               <p:ext uri="{D42A27DB-BD31-4B8C-83A1-F6EECF244321}">
-                <p14:modId xmlns:p14="http://schemas.microsoft.com/office/powerpoint/2010/main" val="4074115700"/>
+                <p14:modId xmlns:p14="http://schemas.microsoft.com/office/powerpoint/2010/main" val="1285202034"/>
               </p:ext>
             </p:extLst>
           </p:nvPr>
@@ -12945,7 +15157,7 @@
                       <a:pPr algn="ctr"/>
                       <a:r>
                         <a:rPr lang="en-US" dirty="0"/>
-                        <a:t>4.72</a:t>
+                        <a:t>12.09</a:t>
                       </a:r>
                     </a:p>
                   </a:txBody>
@@ -12959,7 +15171,7 @@
                       <a:pPr algn="ctr"/>
                       <a:r>
                         <a:rPr lang="en-US" dirty="0"/>
-                        <a:t>58%</a:t>
+                        <a:t>10%</a:t>
                       </a:r>
                     </a:p>
                   </a:txBody>
@@ -12973,7 +15185,7 @@
                       <a:pPr algn="ctr"/>
                       <a:r>
                         <a:rPr lang="en-US" dirty="0"/>
-                        <a:t>891.58</a:t>
+                        <a:t>386.62</a:t>
                       </a:r>
                     </a:p>
                   </a:txBody>
@@ -12987,7 +15199,7 @@
                       <a:pPr algn="ctr"/>
                       <a:r>
                         <a:rPr lang="en-US" dirty="0"/>
-                        <a:t>0.49</a:t>
+                        <a:t>1.29</a:t>
                       </a:r>
                     </a:p>
                   </a:txBody>
@@ -13001,7 +15213,7 @@
                       <a:pPr algn="ctr"/>
                       <a:r>
                         <a:rPr lang="en-US" dirty="0"/>
-                        <a:t>45.14 s</a:t>
+                        <a:t>13.27 s</a:t>
                       </a:r>
                     </a:p>
                   </a:txBody>
@@ -13137,7 +15349,7 @@
           <p:nvPr>
             <p:extLst>
               <p:ext uri="{D42A27DB-BD31-4B8C-83A1-F6EECF244321}">
-                <p14:modId xmlns:p14="http://schemas.microsoft.com/office/powerpoint/2010/main" val="436790717"/>
+                <p14:modId xmlns:p14="http://schemas.microsoft.com/office/powerpoint/2010/main" val="109818177"/>
               </p:ext>
             </p:extLst>
           </p:nvPr>
@@ -13351,7 +15563,7 @@
                       <a:pPr algn="ctr"/>
                       <a:r>
                         <a:rPr lang="en-US" dirty="0"/>
-                        <a:t>295.35 s</a:t>
+                        <a:t>266.86 s</a:t>
                       </a:r>
                     </a:p>
                   </a:txBody>
@@ -13382,7 +15594,7 @@
           <p:nvPr>
             <p:extLst>
               <p:ext uri="{D42A27DB-BD31-4B8C-83A1-F6EECF244321}">
-                <p14:modId xmlns:p14="http://schemas.microsoft.com/office/powerpoint/2010/main" val="5104351"/>
+                <p14:modId xmlns:p14="http://schemas.microsoft.com/office/powerpoint/2010/main" val="1449170211"/>
               </p:ext>
             </p:extLst>
           </p:nvPr>
@@ -13596,7 +15808,7 @@
                       <a:pPr algn="ctr"/>
                       <a:r>
                         <a:rPr lang="en-US" dirty="0"/>
-                        <a:t>5.91 s</a:t>
+                        <a:t>5.34 s</a:t>
                       </a:r>
                     </a:p>
                   </a:txBody>
@@ -13731,7 +15943,7 @@
           <p:nvPr>
             <p:extLst>
               <p:ext uri="{D42A27DB-BD31-4B8C-83A1-F6EECF244321}">
-                <p14:modId xmlns:p14="http://schemas.microsoft.com/office/powerpoint/2010/main" val="4171314948"/>
+                <p14:modId xmlns:p14="http://schemas.microsoft.com/office/powerpoint/2010/main" val="274009746"/>
               </p:ext>
             </p:extLst>
           </p:nvPr>
@@ -14045,6 +16257,15 @@
 </file>
 
 <file path=customXml/item2.xml><?xml version="1.0" encoding="utf-8"?>
+<?mso-contentType ?>
+<FormTemplates xmlns="http://schemas.microsoft.com/sharepoint/v3/contenttype/forms">
+  <Display>DocumentLibraryForm</Display>
+  <Edit>DocumentLibraryForm</Edit>
+  <New>DocumentLibraryForm</New>
+</FormTemplates>
+</file>
+
+<file path=customXml/item3.xml><?xml version="1.0" encoding="utf-8"?>
 <ct:contentTypeSchema xmlns:ct="http://schemas.microsoft.com/office/2006/metadata/contentType" xmlns:ma="http://schemas.microsoft.com/office/2006/metadata/properties/metaAttributes" ct:_="" ma:_="" ma:contentTypeName="Document" ma:contentTypeID="0x01010079F111ED35F8CC479449609E8A0923A6" ma:contentTypeVersion="12" ma:contentTypeDescription="Create a new document." ma:contentTypeScope="" ma:versionID="a410dd7f93c95333ffa1b60ed6adedd1">
   <xsd:schema xmlns:xsd="http://www.w3.org/2001/XMLSchema" xmlns:xs="http://www.w3.org/2001/XMLSchema" xmlns:p="http://schemas.microsoft.com/office/2006/metadata/properties" xmlns:ns2="71af3243-3dd4-4a8d-8c0d-dd76da1f02a5" xmlns:ns3="16c05727-aa75-4e4a-9b5f-8a80a1165891" targetNamespace="http://schemas.microsoft.com/office/2006/metadata/properties" ma:root="true" ma:fieldsID="a936d9baba76aa3866493feff160faab" ns2:_="" ns3:_="">
     <xsd:import namespace="71af3243-3dd4-4a8d-8c0d-dd76da1f02a5"/>
@@ -14265,15 +16486,6 @@
 </ct:contentTypeSchema>
 </file>
 
-<file path=customXml/item3.xml><?xml version="1.0" encoding="utf-8"?>
-<?mso-contentType ?>
-<FormTemplates xmlns="http://schemas.microsoft.com/sharepoint/v3/contenttype/forms">
-  <Display>DocumentLibraryForm</Display>
-  <Edit>DocumentLibraryForm</Edit>
-  <New>DocumentLibraryForm</New>
-</FormTemplates>
-</file>
-
 <file path=customXml/itemProps1.xml><?xml version="1.0" encoding="utf-8"?>
 <ds:datastoreItem xmlns:ds="http://schemas.openxmlformats.org/officeDocument/2006/customXml" ds:itemID="{137651BA-F45C-4845-9AB3-E0A65B39F5E1}">
   <ds:schemaRefs>
@@ -14285,6 +16497,14 @@
 </file>
 
 <file path=customXml/itemProps2.xml><?xml version="1.0" encoding="utf-8"?>
+<ds:datastoreItem xmlns:ds="http://schemas.openxmlformats.org/officeDocument/2006/customXml" ds:itemID="{CDB58277-F8DF-46FF-84EC-EF41B835E69F}">
+  <ds:schemaRefs>
+    <ds:schemaRef ds:uri="http://schemas.microsoft.com/sharepoint/v3/contenttype/forms"/>
+  </ds:schemaRefs>
+</ds:datastoreItem>
+</file>
+
+<file path=customXml/itemProps3.xml><?xml version="1.0" encoding="utf-8"?>
 <ds:datastoreItem xmlns:ds="http://schemas.openxmlformats.org/officeDocument/2006/customXml" ds:itemID="{2D276E62-80A3-44DD-9BCC-97ED2B99B57F}">
   <ds:schemaRefs>
     <ds:schemaRef ds:uri="http://schemas.microsoft.com/office/2006/metadata/contentType"/>
@@ -14301,12 +16521,4 @@
     <ds:schemaRef ds:uri="http://schemas.microsoft.com/internal/obd"/>
   </ds:schemaRefs>
 </ds:datastoreItem>
-</file>
-
-<file path=customXml/itemProps3.xml><?xml version="1.0" encoding="utf-8"?>
-<ds:datastoreItem xmlns:ds="http://schemas.openxmlformats.org/officeDocument/2006/customXml" ds:itemID="{CDB58277-F8DF-46FF-84EC-EF41B835E69F}">
-  <ds:schemaRefs>
-    <ds:schemaRef ds:uri="http://schemas.microsoft.com/sharepoint/v3/contenttype/forms"/>
-  </ds:schemaRefs>
-</ds:datastoreItem>
 </file>
</xml_diff>